<commit_message>
Update lab journal, delete unnecessary files
</commit_message>
<xml_diff>
--- a/data_folder/processed_data/presentation/Отчётная презентация 25 мая 2024 BIOINF Education.pptx
+++ b/data_folder/processed_data/presentation/Отчётная презентация 25 мая 2024 BIOINF Education.pptx
@@ -5,28 +5,25 @@
     <p:sldMasterId id="2147483698" r:id="rId1"/>
   </p:sldMasterIdLst>
   <p:notesMasterIdLst>
-    <p:notesMasterId r:id="rId6"/>
+    <p:notesMasterId r:id="rId8"/>
   </p:notesMasterIdLst>
   <p:sldIdLst>
     <p:sldId id="260" r:id="rId2"/>
     <p:sldId id="261" r:id="rId3"/>
     <p:sldId id="259" r:id="rId4"/>
-    <p:sldId id="258" r:id="rId5"/>
+    <p:sldId id="264" r:id="rId5"/>
+    <p:sldId id="258" r:id="rId6"/>
+    <p:sldId id="262" r:id="rId7"/>
   </p:sldIdLst>
   <p:sldSz cx="9144000" cy="5143500" type="screen16x9"/>
   <p:notesSz cx="6858000" cy="9144000"/>
   <p:embeddedFontLst>
     <p:embeddedFont>
       <p:font typeface="Montserrat" panose="00000500000000000000" pitchFamily="2" charset="-52"/>
-      <p:regular r:id="rId7"/>
-      <p:bold r:id="rId8"/>
-      <p:italic r:id="rId9"/>
-      <p:boldItalic r:id="rId10"/>
-    </p:embeddedFont>
-    <p:embeddedFont>
-      <p:font typeface="Roboto Light" panose="02000000000000000000" pitchFamily="2" charset="0"/>
-      <p:regular r:id="rId11"/>
-      <p:italic r:id="rId12"/>
+      <p:regular r:id="rId9"/>
+      <p:bold r:id="rId10"/>
+      <p:italic r:id="rId11"/>
+      <p:boldItalic r:id="rId12"/>
     </p:embeddedFont>
   </p:embeddedFontLst>
   <p:defaultTextStyle>
@@ -828,6 +825,115 @@
 </file>
 
 <file path=ppt/notesSlides/notesSlide2.xml><?xml version="1.0" encoding="utf-8"?>
+<p:notes xmlns:a="http://schemas.openxmlformats.org/drawingml/2006/main" xmlns:r="http://schemas.openxmlformats.org/officeDocument/2006/relationships" xmlns:p="http://schemas.openxmlformats.org/presentationml/2006/main" showMasterSp="0" showMasterPhAnim="0">
+  <p:cSld>
+    <p:spTree>
+      <p:nvGrpSpPr>
+        <p:cNvPr id="1" name="Shape 222"/>
+        <p:cNvGrpSpPr/>
+        <p:nvPr/>
+      </p:nvGrpSpPr>
+      <p:grpSpPr>
+        <a:xfrm>
+          <a:off x="0" y="0"/>
+          <a:ext cx="0" cy="0"/>
+          <a:chOff x="0" y="0"/>
+          <a:chExt cx="0" cy="0"/>
+        </a:xfrm>
+      </p:grpSpPr>
+      <p:sp>
+        <p:nvSpPr>
+          <p:cNvPr id="223" name="Google Shape;223;g2238c7317ad_100_73:notes"/>
+          <p:cNvSpPr>
+            <a:spLocks noGrp="1" noRot="1" noChangeAspect="1"/>
+          </p:cNvSpPr>
+          <p:nvPr>
+            <p:ph type="sldImg" idx="2"/>
+          </p:nvPr>
+        </p:nvSpPr>
+        <p:spPr>
+          <a:xfrm>
+            <a:off x="381000" y="685800"/>
+            <a:ext cx="6096000" cy="3429000"/>
+          </a:xfrm>
+          <a:custGeom>
+            <a:avLst/>
+            <a:gdLst/>
+            <a:ahLst/>
+            <a:cxnLst/>
+            <a:rect l="l" t="t" r="r" b="b"/>
+            <a:pathLst>
+              <a:path w="120000" h="120000" extrusionOk="0">
+                <a:moveTo>
+                  <a:pt x="0" y="0"/>
+                </a:moveTo>
+                <a:lnTo>
+                  <a:pt x="120000" y="0"/>
+                </a:lnTo>
+                <a:lnTo>
+                  <a:pt x="120000" y="120000"/>
+                </a:lnTo>
+                <a:lnTo>
+                  <a:pt x="0" y="120000"/>
+                </a:lnTo>
+                <a:close/>
+              </a:path>
+            </a:pathLst>
+          </a:custGeom>
+        </p:spPr>
+      </p:sp>
+      <p:sp>
+        <p:nvSpPr>
+          <p:cNvPr id="224" name="Google Shape;224;g2238c7317ad_100_73:notes"/>
+          <p:cNvSpPr txBox="1">
+            <a:spLocks noGrp="1"/>
+          </p:cNvSpPr>
+          <p:nvPr>
+            <p:ph type="body" idx="1"/>
+          </p:nvPr>
+        </p:nvSpPr>
+        <p:spPr>
+          <a:xfrm>
+            <a:off x="685800" y="4343400"/>
+            <a:ext cx="5486400" cy="4114800"/>
+          </a:xfrm>
+          <a:prstGeom prst="rect">
+            <a:avLst/>
+          </a:prstGeom>
+        </p:spPr>
+        <p:txBody>
+          <a:bodyPr spcFirstLastPara="1" wrap="square" lIns="91425" tIns="91425" rIns="91425" bIns="91425" anchor="t" anchorCtr="0">
+            <a:noAutofit/>
+          </a:bodyPr>
+          <a:lstStyle/>
+          <a:p>
+            <a:pPr marL="0" lvl="0" indent="0" algn="l" rtl="0">
+              <a:spcBef>
+                <a:spcPts val="0"/>
+              </a:spcBef>
+              <a:spcAft>
+                <a:spcPts val="0"/>
+              </a:spcAft>
+              <a:buNone/>
+            </a:pPr>
+            <a:endParaRPr/>
+          </a:p>
+        </p:txBody>
+      </p:sp>
+    </p:spTree>
+    <p:extLst>
+      <p:ext uri="{BB962C8B-B14F-4D97-AF65-F5344CB8AC3E}">
+        <p14:creationId xmlns:p14="http://schemas.microsoft.com/office/powerpoint/2010/main" val="789898777"/>
+      </p:ext>
+    </p:extLst>
+  </p:cSld>
+  <p:clrMapOvr>
+    <a:masterClrMapping/>
+  </p:clrMapOvr>
+</p:notes>
+</file>
+
+<file path=ppt/notesSlides/notesSlide3.xml><?xml version="1.0" encoding="utf-8"?>
 <p:notes xmlns:a="http://schemas.openxmlformats.org/drawingml/2006/main" xmlns:r="http://schemas.openxmlformats.org/officeDocument/2006/relationships" xmlns:p="http://schemas.openxmlformats.org/presentationml/2006/main" showMasterSp="0" showMasterPhAnim="0">
   <p:cSld>
     <p:spTree>
@@ -5702,6 +5808,39 @@
           <a:chExt cx="0" cy="0"/>
         </a:xfrm>
       </p:grpSpPr>
+      <p:pic>
+        <p:nvPicPr>
+          <p:cNvPr id="15" name="Google Shape;227;p56">
+            <a:extLst>
+              <a:ext uri="{FF2B5EF4-FFF2-40B4-BE49-F238E27FC236}">
+                <a16:creationId xmlns:a16="http://schemas.microsoft.com/office/drawing/2014/main" id="{63BAC4E8-7367-43E3-ACAB-7427ACC549D6}"/>
+              </a:ext>
+            </a:extLst>
+          </p:cNvPr>
+          <p:cNvPicPr preferRelativeResize="0"/>
+          <p:nvPr/>
+        </p:nvPicPr>
+        <p:blipFill rotWithShape="1">
+          <a:blip r:embed="rId2">
+            <a:alphaModFix amt="27000"/>
+          </a:blip>
+          <a:srcRect r="75555" b="60130"/>
+          <a:stretch/>
+        </p:blipFill>
+        <p:spPr>
+          <a:xfrm>
+            <a:off x="0" y="-9"/>
+            <a:ext cx="2235197" cy="2050707"/>
+          </a:xfrm>
+          <a:prstGeom prst="rect">
+            <a:avLst/>
+          </a:prstGeom>
+          <a:noFill/>
+          <a:ln>
+            <a:noFill/>
+          </a:ln>
+        </p:spPr>
+      </p:pic>
       <p:sp>
         <p:nvSpPr>
           <p:cNvPr id="5" name="Заголовок 4">
@@ -5802,7 +5941,7 @@
           </a:bodyPr>
           <a:lstStyle/>
           <a:p>
-            <a:pPr marL="0" lvl="0" indent="0" algn="l" rtl="0">
+            <a:pPr marL="0" lvl="0" indent="0" algn="r" rtl="0">
               <a:spcBef>
                 <a:spcPts val="0"/>
               </a:spcBef>
@@ -5825,7 +5964,7 @@
             </a:r>
           </a:p>
           <a:p>
-            <a:pPr marL="0" lvl="0" indent="0" algn="l" rtl="0">
+            <a:pPr marL="0" lvl="0" indent="0" algn="r" rtl="0">
               <a:spcBef>
                 <a:spcPts val="0"/>
               </a:spcBef>
@@ -5869,7 +6008,7 @@
             </a:endParaRPr>
           </a:p>
           <a:p>
-            <a:pPr marL="0" lvl="0" indent="0" algn="l" rtl="0">
+            <a:pPr marL="0" lvl="0" indent="0" algn="r" rtl="0">
               <a:spcBef>
                 <a:spcPts val="0"/>
               </a:spcBef>
@@ -5901,7 +6040,7 @@
             </a:endParaRPr>
           </a:p>
           <a:p>
-            <a:pPr marL="0" lvl="0" indent="0" algn="l" rtl="0">
+            <a:pPr marL="0" lvl="0" indent="0" algn="r" rtl="0">
               <a:spcBef>
                 <a:spcPts val="0"/>
               </a:spcBef>
@@ -5968,7 +6107,7 @@
           <p:nvPr/>
         </p:nvPicPr>
         <p:blipFill>
-          <a:blip r:embed="rId2">
+          <a:blip r:embed="rId3">
             <a:alphaModFix/>
           </a:blip>
           <a:stretch>
@@ -5989,178 +6128,157 @@
           </a:ln>
         </p:spPr>
       </p:pic>
-      <p:grpSp>
-        <p:nvGrpSpPr>
-          <p:cNvPr id="12" name="Группа 11">
+      <p:pic>
+        <p:nvPicPr>
+          <p:cNvPr id="7" name="Рисунок 6" descr="Изображение выглядит как шаблон, пиксель, шов&#10;&#10;Автоматически созданное описание">
             <a:extLst>
               <a:ext uri="{FF2B5EF4-FFF2-40B4-BE49-F238E27FC236}">
-                <a16:creationId xmlns:a16="http://schemas.microsoft.com/office/drawing/2014/main" id="{0C491626-AEA6-4D0C-A075-C5F44683998C}"/>
+                <a16:creationId xmlns:a16="http://schemas.microsoft.com/office/drawing/2014/main" id="{8D024B74-AAD1-4FC8-9328-E6D2DD509BE0}"/>
               </a:ext>
             </a:extLst>
           </p:cNvPr>
-          <p:cNvGrpSpPr/>
+          <p:cNvPicPr>
+            <a:picLocks noChangeAspect="1"/>
+          </p:cNvPicPr>
           <p:nvPr/>
-        </p:nvGrpSpPr>
-        <p:grpSpPr>
+        </p:nvPicPr>
+        <p:blipFill>
+          <a:blip r:embed="rId4"/>
+          <a:stretch>
+            <a:fillRect/>
+          </a:stretch>
+        </p:blipFill>
+        <p:spPr>
+          <a:xfrm>
+            <a:off x="854617" y="3352845"/>
+            <a:ext cx="1198885" cy="1198885"/>
+          </a:xfrm>
+          <a:prstGeom prst="rect">
+            <a:avLst/>
+          </a:prstGeom>
+        </p:spPr>
+      </p:pic>
+      <p:pic>
+        <p:nvPicPr>
+          <p:cNvPr id="8" name="Рисунок 7" descr="Изображение выглядит как графическая вставка, символ, Графика, дизайн&#10;&#10;Автоматически созданное описание">
+            <a:extLst>
+              <a:ext uri="{FF2B5EF4-FFF2-40B4-BE49-F238E27FC236}">
+                <a16:creationId xmlns:a16="http://schemas.microsoft.com/office/drawing/2014/main" id="{027911A0-B92F-4045-8857-06757E9E2D08}"/>
+              </a:ext>
+            </a:extLst>
+          </p:cNvPr>
+          <p:cNvPicPr>
+            <a:picLocks noChangeAspect="1"/>
+          </p:cNvPicPr>
+          <p:nvPr/>
+        </p:nvPicPr>
+        <p:blipFill>
+          <a:blip r:embed="rId5"/>
+          <a:stretch>
+            <a:fillRect/>
+          </a:stretch>
+        </p:blipFill>
+        <p:spPr>
+          <a:xfrm>
+            <a:off x="1633953" y="3019469"/>
+            <a:ext cx="333375" cy="333375"/>
+          </a:xfrm>
+          <a:prstGeom prst="rect">
+            <a:avLst/>
+          </a:prstGeom>
+        </p:spPr>
+      </p:pic>
+      <p:sp>
+        <p:nvSpPr>
+          <p:cNvPr id="10" name="TextBox 9">
+            <a:extLst>
+              <a:ext uri="{FF2B5EF4-FFF2-40B4-BE49-F238E27FC236}">
+                <a16:creationId xmlns:a16="http://schemas.microsoft.com/office/drawing/2014/main" id="{782F4033-8741-4913-B615-8C6E18434A0C}"/>
+              </a:ext>
+            </a:extLst>
+          </p:cNvPr>
+          <p:cNvSpPr txBox="1"/>
+          <p:nvPr/>
+        </p:nvSpPr>
+        <p:spPr>
+          <a:xfrm>
+            <a:off x="854616" y="3045067"/>
+            <a:ext cx="779337" cy="307777"/>
+          </a:xfrm>
+          <a:prstGeom prst="rect">
+            <a:avLst/>
+          </a:prstGeom>
+          <a:noFill/>
+        </p:spPr>
+        <p:txBody>
+          <a:bodyPr wrap="square">
+            <a:spAutoFit/>
+          </a:bodyPr>
+          <a:lstStyle/>
+          <a:p>
+            <a:pPr algn="ctr"/>
+            <a:r>
+              <a:rPr lang="en-US" dirty="0">
+                <a:hlinkClick r:id="rId6"/>
+              </a:rPr>
+              <a:t>GitHub</a:t>
+            </a:r>
+            <a:endParaRPr lang="ru-RU" dirty="0"/>
+          </a:p>
+        </p:txBody>
+      </p:sp>
+      <p:sp>
+        <p:nvSpPr>
+          <p:cNvPr id="11" name="Прямоугольник 10">
+            <a:extLst>
+              <a:ext uri="{FF2B5EF4-FFF2-40B4-BE49-F238E27FC236}">
+                <a16:creationId xmlns:a16="http://schemas.microsoft.com/office/drawing/2014/main" id="{06DC8C55-8DEA-40E4-8B69-182DF4750A34}"/>
+              </a:ext>
+            </a:extLst>
+          </p:cNvPr>
+          <p:cNvSpPr/>
+          <p:nvPr/>
+        </p:nvSpPr>
+        <p:spPr>
           <a:xfrm>
             <a:off x="854616" y="3019469"/>
             <a:ext cx="1198886" cy="1532261"/>
-            <a:chOff x="797466" y="3098464"/>
-            <a:chExt cx="1198886" cy="1532261"/>
           </a:xfrm>
-        </p:grpSpPr>
-        <p:pic>
-          <p:nvPicPr>
-            <p:cNvPr id="7" name="Рисунок 6" descr="Изображение выглядит как шаблон, пиксель, шов&#10;&#10;Автоматически созданное описание">
-              <a:extLst>
-                <a:ext uri="{FF2B5EF4-FFF2-40B4-BE49-F238E27FC236}">
-                  <a16:creationId xmlns:a16="http://schemas.microsoft.com/office/drawing/2014/main" id="{8D024B74-AAD1-4FC8-9328-E6D2DD509BE0}"/>
-                </a:ext>
-              </a:extLst>
-            </p:cNvPr>
-            <p:cNvPicPr>
-              <a:picLocks noChangeAspect="1"/>
-            </p:cNvPicPr>
-            <p:nvPr/>
-          </p:nvPicPr>
-          <p:blipFill>
-            <a:blip r:embed="rId3"/>
-            <a:stretch>
-              <a:fillRect/>
-            </a:stretch>
-          </p:blipFill>
-          <p:spPr>
-            <a:xfrm>
-              <a:off x="797467" y="3431840"/>
-              <a:ext cx="1198885" cy="1198885"/>
-            </a:xfrm>
-            <a:prstGeom prst="rect">
-              <a:avLst/>
-            </a:prstGeom>
-          </p:spPr>
-        </p:pic>
-        <p:pic>
-          <p:nvPicPr>
-            <p:cNvPr id="8" name="Рисунок 7" descr="Изображение выглядит как графическая вставка, символ, Графика, дизайн&#10;&#10;Автоматически созданное описание">
-              <a:extLst>
-                <a:ext uri="{FF2B5EF4-FFF2-40B4-BE49-F238E27FC236}">
-                  <a16:creationId xmlns:a16="http://schemas.microsoft.com/office/drawing/2014/main" id="{027911A0-B92F-4045-8857-06757E9E2D08}"/>
-                </a:ext>
-              </a:extLst>
-            </p:cNvPr>
-            <p:cNvPicPr>
-              <a:picLocks noChangeAspect="1"/>
-            </p:cNvPicPr>
-            <p:nvPr/>
-          </p:nvPicPr>
-          <p:blipFill>
-            <a:blip r:embed="rId4"/>
-            <a:stretch>
-              <a:fillRect/>
-            </a:stretch>
-          </p:blipFill>
-          <p:spPr>
-            <a:xfrm>
-              <a:off x="1576803" y="3098464"/>
-              <a:ext cx="333375" cy="333375"/>
-            </a:xfrm>
-            <a:prstGeom prst="rect">
-              <a:avLst/>
-            </a:prstGeom>
-          </p:spPr>
-        </p:pic>
-        <p:sp>
-          <p:nvSpPr>
-            <p:cNvPr id="10" name="TextBox 9">
-              <a:extLst>
-                <a:ext uri="{FF2B5EF4-FFF2-40B4-BE49-F238E27FC236}">
-                  <a16:creationId xmlns:a16="http://schemas.microsoft.com/office/drawing/2014/main" id="{782F4033-8741-4913-B615-8C6E18434A0C}"/>
-                </a:ext>
-              </a:extLst>
-            </p:cNvPr>
-            <p:cNvSpPr txBox="1"/>
-            <p:nvPr/>
-          </p:nvSpPr>
-          <p:spPr>
-            <a:xfrm>
-              <a:off x="797466" y="3124062"/>
-              <a:ext cx="779337" cy="307777"/>
-            </a:xfrm>
-            <a:prstGeom prst="rect">
-              <a:avLst/>
-            </a:prstGeom>
-            <a:noFill/>
-          </p:spPr>
-          <p:txBody>
-            <a:bodyPr wrap="square">
-              <a:spAutoFit/>
-            </a:bodyPr>
-            <a:lstStyle/>
-            <a:p>
-              <a:pPr algn="ctr"/>
-              <a:r>
-                <a:rPr lang="en-US" dirty="0">
-                  <a:hlinkClick r:id="rId5"/>
-                </a:rPr>
-                <a:t>GitHub</a:t>
-              </a:r>
-              <a:endParaRPr lang="ru-RU" dirty="0"/>
-            </a:p>
-          </p:txBody>
-        </p:sp>
-        <p:sp>
-          <p:nvSpPr>
-            <p:cNvPr id="11" name="Прямоугольник 10">
-              <a:extLst>
-                <a:ext uri="{FF2B5EF4-FFF2-40B4-BE49-F238E27FC236}">
-                  <a16:creationId xmlns:a16="http://schemas.microsoft.com/office/drawing/2014/main" id="{06DC8C55-8DEA-40E4-8B69-182DF4750A34}"/>
-                </a:ext>
-              </a:extLst>
-            </p:cNvPr>
-            <p:cNvSpPr/>
-            <p:nvPr/>
-          </p:nvSpPr>
-          <p:spPr>
-            <a:xfrm>
-              <a:off x="797466" y="3098464"/>
-              <a:ext cx="1198886" cy="1532261"/>
-            </a:xfrm>
-            <a:prstGeom prst="rect">
-              <a:avLst/>
-            </a:prstGeom>
-            <a:noFill/>
-            <a:ln>
-              <a:solidFill>
-                <a:schemeClr val="tx1"/>
-              </a:solidFill>
-            </a:ln>
-          </p:spPr>
-          <p:style>
-            <a:lnRef idx="2">
-              <a:schemeClr val="accent1">
-                <a:shade val="50000"/>
-              </a:schemeClr>
-            </a:lnRef>
-            <a:fillRef idx="1">
-              <a:schemeClr val="accent1"/>
-            </a:fillRef>
-            <a:effectRef idx="0">
-              <a:schemeClr val="accent1"/>
-            </a:effectRef>
-            <a:fontRef idx="minor">
-              <a:schemeClr val="lt1"/>
-            </a:fontRef>
-          </p:style>
-          <p:txBody>
-            <a:bodyPr rtlCol="0" anchor="ctr"/>
-            <a:lstStyle/>
-            <a:p>
-              <a:pPr algn="ctr"/>
-              <a:endParaRPr lang="ru-RU"/>
-            </a:p>
-          </p:txBody>
-        </p:sp>
-      </p:grpSp>
+          <a:prstGeom prst="rect">
+            <a:avLst/>
+          </a:prstGeom>
+          <a:noFill/>
+          <a:ln>
+            <a:solidFill>
+              <a:schemeClr val="tx1"/>
+            </a:solidFill>
+          </a:ln>
+        </p:spPr>
+        <p:style>
+          <a:lnRef idx="2">
+            <a:schemeClr val="accent1">
+              <a:shade val="50000"/>
+            </a:schemeClr>
+          </a:lnRef>
+          <a:fillRef idx="1">
+            <a:schemeClr val="accent1"/>
+          </a:fillRef>
+          <a:effectRef idx="0">
+            <a:schemeClr val="accent1"/>
+          </a:effectRef>
+          <a:fontRef idx="minor">
+            <a:schemeClr val="lt1"/>
+          </a:fontRef>
+        </p:style>
+        <p:txBody>
+          <a:bodyPr rtlCol="0" anchor="ctr"/>
+          <a:lstStyle/>
+          <a:p>
+            <a:pPr algn="ctr"/>
+            <a:endParaRPr lang="ru-RU"/>
+          </a:p>
+        </p:txBody>
+      </p:sp>
     </p:spTree>
     <p:extLst>
       <p:ext uri="{BB962C8B-B14F-4D97-AF65-F5344CB8AC3E}">
@@ -6191,6 +6309,73 @@
           <a:chExt cx="0" cy="0"/>
         </a:xfrm>
       </p:grpSpPr>
+      <p:pic>
+        <p:nvPicPr>
+          <p:cNvPr id="13" name="Google Shape;227;p56">
+            <a:extLst>
+              <a:ext uri="{FF2B5EF4-FFF2-40B4-BE49-F238E27FC236}">
+                <a16:creationId xmlns:a16="http://schemas.microsoft.com/office/drawing/2014/main" id="{A77A3683-80C0-44EB-846A-AFD4F4AAC810}"/>
+              </a:ext>
+            </a:extLst>
+          </p:cNvPr>
+          <p:cNvPicPr preferRelativeResize="0"/>
+          <p:nvPr/>
+        </p:nvPicPr>
+        <p:blipFill rotWithShape="1">
+          <a:blip r:embed="rId2">
+            <a:alphaModFix amt="27000"/>
+          </a:blip>
+          <a:srcRect r="75555" b="60130"/>
+          <a:stretch/>
+        </p:blipFill>
+        <p:spPr>
+          <a:xfrm>
+            <a:off x="0" y="-9"/>
+            <a:ext cx="2235197" cy="2050707"/>
+          </a:xfrm>
+          <a:prstGeom prst="rect">
+            <a:avLst/>
+          </a:prstGeom>
+          <a:noFill/>
+          <a:ln>
+            <a:noFill/>
+          </a:ln>
+        </p:spPr>
+      </p:pic>
+      <p:pic>
+        <p:nvPicPr>
+          <p:cNvPr id="14" name="Google Shape;230;p56">
+            <a:extLst>
+              <a:ext uri="{FF2B5EF4-FFF2-40B4-BE49-F238E27FC236}">
+                <a16:creationId xmlns:a16="http://schemas.microsoft.com/office/drawing/2014/main" id="{4D7A7B1E-0235-4EFB-B378-AF5F7E9DBB18}"/>
+              </a:ext>
+            </a:extLst>
+          </p:cNvPr>
+          <p:cNvPicPr preferRelativeResize="0"/>
+          <p:nvPr/>
+        </p:nvPicPr>
+        <p:blipFill>
+          <a:blip r:embed="rId3">
+            <a:alphaModFix/>
+          </a:blip>
+          <a:stretch>
+            <a:fillRect/>
+          </a:stretch>
+        </p:blipFill>
+        <p:spPr>
+          <a:xfrm>
+            <a:off x="7040625" y="146800"/>
+            <a:ext cx="1874775" cy="454475"/>
+          </a:xfrm>
+          <a:prstGeom prst="rect">
+            <a:avLst/>
+          </a:prstGeom>
+          <a:noFill/>
+          <a:ln>
+            <a:noFill/>
+          </a:ln>
+        </p:spPr>
+      </p:pic>
       <p:sp>
         <p:nvSpPr>
           <p:cNvPr id="15" name="Заголовок 14">
@@ -6433,7 +6618,7 @@
             <a:r>
               <a:rPr lang="en-US" sz="2000" b="1" i="0" u="none" strike="noStrike" dirty="0">
                 <a:solidFill>
-                  <a:srgbClr val="000000"/>
+                  <a:schemeClr val="tx1"/>
                 </a:solidFill>
                 <a:effectLst/>
                 <a:latin typeface="Montserrat" panose="00000500000000000000" pitchFamily="2" charset="-52"/>
@@ -6443,7 +6628,7 @@
             <a:r>
               <a:rPr lang="en-US" sz="2000" b="1" dirty="0">
                 <a:solidFill>
-                  <a:schemeClr val="dk1"/>
+                  <a:schemeClr val="tx1"/>
                 </a:solidFill>
                 <a:latin typeface="Montserrat"/>
                 <a:ea typeface="Montserrat"/>
@@ -6462,7 +6647,7 @@
                 <a:spcPts val="0"/>
               </a:spcAft>
               <a:buClr>
-                <a:srgbClr val="0A9C55"/>
+                <a:schemeClr val="tx1"/>
               </a:buClr>
               <a:buSzPts val="1000"/>
               <a:buFont typeface="Montserrat"/>
@@ -6489,9 +6674,7 @@
               <a:spcAft>
                 <a:spcPts val="0"/>
               </a:spcAft>
-              <a:buClr>
-                <a:srgbClr val="0A9C55"/>
-              </a:buClr>
+              <a:buClrTx/>
               <a:buSzPts val="1000"/>
               <a:buFont typeface="Montserrat"/>
               <a:buAutoNum type="arabicPeriod"/>
@@ -6512,7 +6695,7 @@
           <a:p>
             <a:pPr marL="179999" indent="-149225">
               <a:buClr>
-                <a:srgbClr val="0A9C55"/>
+                <a:schemeClr val="tx1"/>
               </a:buClr>
               <a:buSzPts val="1000"/>
               <a:buFont typeface="Montserrat"/>
@@ -6534,7 +6717,7 @@
           <a:p>
             <a:pPr marL="179999" indent="-149225">
               <a:buClr>
-                <a:srgbClr val="0A9C55"/>
+                <a:schemeClr val="tx1"/>
               </a:buClr>
               <a:buSzPts val="1000"/>
               <a:buFont typeface="Montserrat"/>
@@ -6612,15 +6795,6 @@
               </a:rPr>
               <a:t>.</a:t>
             </a:r>
-            <a:endParaRPr lang="en-US" sz="1400" dirty="0">
-              <a:solidFill>
-                <a:srgbClr val="0A9C55"/>
-              </a:solidFill>
-              <a:latin typeface="Montserrat"/>
-              <a:ea typeface="Montserrat"/>
-              <a:cs typeface="Montserrat"/>
-              <a:sym typeface="Montserrat"/>
-            </a:endParaRPr>
           </a:p>
           <a:p>
             <a:endParaRPr lang="ru-RU" dirty="0"/>
@@ -6709,7 +6883,7 @@
           <p:nvPr/>
         </p:nvPicPr>
         <p:blipFill>
-          <a:blip r:embed="rId2"/>
+          <a:blip r:embed="rId4"/>
           <a:stretch>
             <a:fillRect/>
           </a:stretch>
@@ -6739,7 +6913,7 @@
           <p:nvPr/>
         </p:nvPicPr>
         <p:blipFill>
-          <a:blip r:embed="rId3"/>
+          <a:blip r:embed="rId5"/>
           <a:stretch>
             <a:fillRect/>
           </a:stretch>
@@ -6769,7 +6943,7 @@
           <p:nvPr/>
         </p:nvPicPr>
         <p:blipFill rotWithShape="1">
-          <a:blip r:embed="rId4"/>
+          <a:blip r:embed="rId6"/>
           <a:srcRect t="1" b="1476"/>
           <a:stretch/>
         </p:blipFill>
@@ -7043,7 +7217,7 @@
         </p:blipFill>
         <p:spPr>
           <a:xfrm>
-            <a:off x="4230828" y="672278"/>
+            <a:off x="4230828" y="981114"/>
             <a:ext cx="4847471" cy="4046400"/>
           </a:xfrm>
           <a:prstGeom prst="rect">
@@ -7078,67 +7252,6 @@
           </a:ln>
         </p:spPr>
       </p:pic>
-      <p:sp>
-        <p:nvSpPr>
-          <p:cNvPr id="229" name="Google Shape;229;p56"/>
-          <p:cNvSpPr txBox="1">
-            <a:spLocks noGrp="1"/>
-          </p:cNvSpPr>
-          <p:nvPr>
-            <p:ph type="title"/>
-          </p:nvPr>
-        </p:nvSpPr>
-        <p:spPr>
-          <a:xfrm>
-            <a:off x="124811" y="161400"/>
-            <a:ext cx="3934774" cy="667276"/>
-          </a:xfrm>
-          <a:prstGeom prst="rect">
-            <a:avLst/>
-          </a:prstGeom>
-          <a:noFill/>
-        </p:spPr>
-        <p:txBody>
-          <a:bodyPr spcFirstLastPara="1" wrap="square" lIns="91425" tIns="91425" rIns="91425" bIns="91425" anchor="t" anchorCtr="0">
-            <a:noAutofit/>
-          </a:bodyPr>
-          <a:lstStyle/>
-          <a:p>
-            <a:pPr marL="0" lvl="0" indent="0" algn="l" rtl="0">
-              <a:spcBef>
-                <a:spcPts val="0"/>
-              </a:spcBef>
-              <a:spcAft>
-                <a:spcPts val="0"/>
-              </a:spcAft>
-              <a:buClr>
-                <a:schemeClr val="dk1"/>
-              </a:buClr>
-              <a:buSzPts val="3400"/>
-              <a:buFont typeface="Roboto Light"/>
-              <a:buNone/>
-            </a:pPr>
-            <a:r>
-              <a:rPr lang="en-US" sz="1600" b="1" dirty="0">
-                <a:solidFill>
-                  <a:schemeClr val="tx1"/>
-                </a:solidFill>
-                <a:latin typeface="Montserrat"/>
-                <a:ea typeface="Montserrat"/>
-                <a:cs typeface="Montserrat"/>
-                <a:sym typeface="Montserrat"/>
-              </a:rPr>
-              <a:t>Identify transcripts with significant changes in expression.</a:t>
-            </a:r>
-            <a:endParaRPr lang="en-US" sz="1600" b="1" dirty="0">
-              <a:latin typeface="Montserrat"/>
-              <a:ea typeface="Montserrat"/>
-              <a:cs typeface="Montserrat"/>
-              <a:sym typeface="Montserrat"/>
-            </a:endParaRPr>
-          </a:p>
-        </p:txBody>
-      </p:sp>
       <p:sp>
         <p:nvSpPr>
           <p:cNvPr id="235" name="Google Shape;235;p56"/>
@@ -7215,6 +7328,365 @@
           </a:ln>
         </p:spPr>
       </p:pic>
+      <p:sp>
+        <p:nvSpPr>
+          <p:cNvPr id="2" name="TextBox 1">
+            <a:extLst>
+              <a:ext uri="{FF2B5EF4-FFF2-40B4-BE49-F238E27FC236}">
+                <a16:creationId xmlns:a16="http://schemas.microsoft.com/office/drawing/2014/main" id="{1F20F95C-31D0-4830-ACC4-9527BD0003B4}"/>
+              </a:ext>
+            </a:extLst>
+          </p:cNvPr>
+          <p:cNvSpPr txBox="1"/>
+          <p:nvPr/>
+        </p:nvSpPr>
+        <p:spPr>
+          <a:xfrm>
+            <a:off x="124811" y="1550293"/>
+            <a:ext cx="4048876" cy="2862322"/>
+          </a:xfrm>
+          <a:prstGeom prst="rect">
+            <a:avLst/>
+          </a:prstGeom>
+          <a:noFill/>
+        </p:spPr>
+        <p:txBody>
+          <a:bodyPr wrap="square" rtlCol="0">
+            <a:spAutoFit/>
+          </a:bodyPr>
+          <a:lstStyle/>
+          <a:p>
+            <a:pPr marL="285750" indent="-285750">
+              <a:buFont typeface="Arial" panose="020B0604020202020204" pitchFamily="34" charset="0"/>
+              <a:buChar char="•"/>
+            </a:pPr>
+            <a:r>
+              <a:rPr lang="en-US" sz="1800" dirty="0">
+                <a:solidFill>
+                  <a:srgbClr val="000000"/>
+                </a:solidFill>
+                <a:effectLst/>
+                <a:latin typeface="Times New Roman" panose="02020603050405020304" pitchFamily="18" charset="0"/>
+                <a:ea typeface="Times New Roman" panose="02020603050405020304" pitchFamily="18" charset="0"/>
+              </a:rPr>
+              <a:t>We identified 123445 differentially expressed transcripts, 5196 (4.2%) of them show significant change in expression (i.e. adjusted p-value was lesser than 0.05).</a:t>
+            </a:r>
+          </a:p>
+          <a:p>
+            <a:pPr marL="285750" indent="-285750">
+              <a:buFont typeface="Arial" panose="020B0604020202020204" pitchFamily="34" charset="0"/>
+              <a:buChar char="•"/>
+            </a:pPr>
+            <a:r>
+              <a:rPr lang="en-US" sz="1800" dirty="0">
+                <a:solidFill>
+                  <a:srgbClr val="000000"/>
+                </a:solidFill>
+                <a:effectLst/>
+                <a:latin typeface="Times New Roman" panose="02020603050405020304" pitchFamily="18" charset="0"/>
+                <a:ea typeface="Times New Roman" panose="02020603050405020304" pitchFamily="18" charset="0"/>
+              </a:rPr>
+              <a:t>An upregulation in expression was observed for most transcripts (orange and red dots) while little part showed downregulation in expression (blue and green dots).</a:t>
+            </a:r>
+            <a:endParaRPr lang="ru-RU" dirty="0"/>
+          </a:p>
+        </p:txBody>
+      </p:sp>
+      <p:sp>
+        <p:nvSpPr>
+          <p:cNvPr id="8" name="Заголовок 14">
+            <a:extLst>
+              <a:ext uri="{FF2B5EF4-FFF2-40B4-BE49-F238E27FC236}">
+                <a16:creationId xmlns:a16="http://schemas.microsoft.com/office/drawing/2014/main" id="{A8FA27F3-8725-498C-AEC2-FD27DFB7A200}"/>
+              </a:ext>
+            </a:extLst>
+          </p:cNvPr>
+          <p:cNvSpPr txBox="1">
+            <a:spLocks/>
+          </p:cNvSpPr>
+          <p:nvPr/>
+        </p:nvSpPr>
+        <p:spPr>
+          <a:xfrm>
+            <a:off x="311700" y="445024"/>
+            <a:ext cx="6405106" cy="835816"/>
+          </a:xfrm>
+          <a:prstGeom prst="rect">
+            <a:avLst/>
+          </a:prstGeom>
+          <a:noFill/>
+          <a:ln>
+            <a:noFill/>
+          </a:ln>
+        </p:spPr>
+        <p:txBody>
+          <a:bodyPr spcFirstLastPara="1" wrap="square" lIns="91425" tIns="91425" rIns="91425" bIns="91425" anchor="t" anchorCtr="0">
+            <a:noAutofit/>
+          </a:bodyPr>
+          <a:lstStyle>
+            <a:defPPr marR="0" lvl="0" algn="l" rtl="0">
+              <a:lnSpc>
+                <a:spcPct val="100000"/>
+              </a:lnSpc>
+              <a:spcBef>
+                <a:spcPts val="0"/>
+              </a:spcBef>
+              <a:spcAft>
+                <a:spcPts val="0"/>
+              </a:spcAft>
+            </a:defPPr>
+            <a:lvl1pPr marR="0" lvl="0" algn="l" rtl="0">
+              <a:lnSpc>
+                <a:spcPct val="100000"/>
+              </a:lnSpc>
+              <a:spcBef>
+                <a:spcPts val="0"/>
+              </a:spcBef>
+              <a:spcAft>
+                <a:spcPts val="0"/>
+              </a:spcAft>
+              <a:buClr>
+                <a:schemeClr val="dk1"/>
+              </a:buClr>
+              <a:buSzPts val="2800"/>
+              <a:buFont typeface="Arial"/>
+              <a:buNone/>
+              <a:defRPr sz="2800" b="0" i="0" u="none" strike="noStrike" cap="none">
+                <a:solidFill>
+                  <a:schemeClr val="dk1"/>
+                </a:solidFill>
+                <a:latin typeface="Arial"/>
+                <a:ea typeface="Arial"/>
+                <a:cs typeface="Arial"/>
+                <a:sym typeface="Arial"/>
+              </a:defRPr>
+            </a:lvl1pPr>
+            <a:lvl2pPr marR="0" lvl="1" algn="l" rtl="0">
+              <a:lnSpc>
+                <a:spcPct val="100000"/>
+              </a:lnSpc>
+              <a:spcBef>
+                <a:spcPts val="0"/>
+              </a:spcBef>
+              <a:spcAft>
+                <a:spcPts val="0"/>
+              </a:spcAft>
+              <a:buClr>
+                <a:schemeClr val="dk1"/>
+              </a:buClr>
+              <a:buSzPts val="2800"/>
+              <a:buFont typeface="Arial"/>
+              <a:buNone/>
+              <a:defRPr sz="2800" b="0" i="0" u="none" strike="noStrike" cap="none">
+                <a:solidFill>
+                  <a:schemeClr val="dk1"/>
+                </a:solidFill>
+                <a:latin typeface="Arial"/>
+                <a:ea typeface="Arial"/>
+                <a:cs typeface="Arial"/>
+                <a:sym typeface="Arial"/>
+              </a:defRPr>
+            </a:lvl2pPr>
+            <a:lvl3pPr marR="0" lvl="2" algn="l" rtl="0">
+              <a:lnSpc>
+                <a:spcPct val="100000"/>
+              </a:lnSpc>
+              <a:spcBef>
+                <a:spcPts val="0"/>
+              </a:spcBef>
+              <a:spcAft>
+                <a:spcPts val="0"/>
+              </a:spcAft>
+              <a:buClr>
+                <a:schemeClr val="dk1"/>
+              </a:buClr>
+              <a:buSzPts val="2800"/>
+              <a:buFont typeface="Arial"/>
+              <a:buNone/>
+              <a:defRPr sz="2800" b="0" i="0" u="none" strike="noStrike" cap="none">
+                <a:solidFill>
+                  <a:schemeClr val="dk1"/>
+                </a:solidFill>
+                <a:latin typeface="Arial"/>
+                <a:ea typeface="Arial"/>
+                <a:cs typeface="Arial"/>
+                <a:sym typeface="Arial"/>
+              </a:defRPr>
+            </a:lvl3pPr>
+            <a:lvl4pPr marR="0" lvl="3" algn="l" rtl="0">
+              <a:lnSpc>
+                <a:spcPct val="100000"/>
+              </a:lnSpc>
+              <a:spcBef>
+                <a:spcPts val="0"/>
+              </a:spcBef>
+              <a:spcAft>
+                <a:spcPts val="0"/>
+              </a:spcAft>
+              <a:buClr>
+                <a:schemeClr val="dk1"/>
+              </a:buClr>
+              <a:buSzPts val="2800"/>
+              <a:buFont typeface="Arial"/>
+              <a:buNone/>
+              <a:defRPr sz="2800" b="0" i="0" u="none" strike="noStrike" cap="none">
+                <a:solidFill>
+                  <a:schemeClr val="dk1"/>
+                </a:solidFill>
+                <a:latin typeface="Arial"/>
+                <a:ea typeface="Arial"/>
+                <a:cs typeface="Arial"/>
+                <a:sym typeface="Arial"/>
+              </a:defRPr>
+            </a:lvl4pPr>
+            <a:lvl5pPr marR="0" lvl="4" algn="l" rtl="0">
+              <a:lnSpc>
+                <a:spcPct val="100000"/>
+              </a:lnSpc>
+              <a:spcBef>
+                <a:spcPts val="0"/>
+              </a:spcBef>
+              <a:spcAft>
+                <a:spcPts val="0"/>
+              </a:spcAft>
+              <a:buClr>
+                <a:schemeClr val="dk1"/>
+              </a:buClr>
+              <a:buSzPts val="2800"/>
+              <a:buFont typeface="Arial"/>
+              <a:buNone/>
+              <a:defRPr sz="2800" b="0" i="0" u="none" strike="noStrike" cap="none">
+                <a:solidFill>
+                  <a:schemeClr val="dk1"/>
+                </a:solidFill>
+                <a:latin typeface="Arial"/>
+                <a:ea typeface="Arial"/>
+                <a:cs typeface="Arial"/>
+                <a:sym typeface="Arial"/>
+              </a:defRPr>
+            </a:lvl5pPr>
+            <a:lvl6pPr marR="0" lvl="5" algn="l" rtl="0">
+              <a:lnSpc>
+                <a:spcPct val="100000"/>
+              </a:lnSpc>
+              <a:spcBef>
+                <a:spcPts val="0"/>
+              </a:spcBef>
+              <a:spcAft>
+                <a:spcPts val="0"/>
+              </a:spcAft>
+              <a:buClr>
+                <a:schemeClr val="dk1"/>
+              </a:buClr>
+              <a:buSzPts val="2800"/>
+              <a:buFont typeface="Arial"/>
+              <a:buNone/>
+              <a:defRPr sz="2800" b="0" i="0" u="none" strike="noStrike" cap="none">
+                <a:solidFill>
+                  <a:schemeClr val="dk1"/>
+                </a:solidFill>
+                <a:latin typeface="Arial"/>
+                <a:ea typeface="Arial"/>
+                <a:cs typeface="Arial"/>
+                <a:sym typeface="Arial"/>
+              </a:defRPr>
+            </a:lvl6pPr>
+            <a:lvl7pPr marR="0" lvl="6" algn="l" rtl="0">
+              <a:lnSpc>
+                <a:spcPct val="100000"/>
+              </a:lnSpc>
+              <a:spcBef>
+                <a:spcPts val="0"/>
+              </a:spcBef>
+              <a:spcAft>
+                <a:spcPts val="0"/>
+              </a:spcAft>
+              <a:buClr>
+                <a:schemeClr val="dk1"/>
+              </a:buClr>
+              <a:buSzPts val="2800"/>
+              <a:buFont typeface="Arial"/>
+              <a:buNone/>
+              <a:defRPr sz="2800" b="0" i="0" u="none" strike="noStrike" cap="none">
+                <a:solidFill>
+                  <a:schemeClr val="dk1"/>
+                </a:solidFill>
+                <a:latin typeface="Arial"/>
+                <a:ea typeface="Arial"/>
+                <a:cs typeface="Arial"/>
+                <a:sym typeface="Arial"/>
+              </a:defRPr>
+            </a:lvl7pPr>
+            <a:lvl8pPr marR="0" lvl="7" algn="l" rtl="0">
+              <a:lnSpc>
+                <a:spcPct val="100000"/>
+              </a:lnSpc>
+              <a:spcBef>
+                <a:spcPts val="0"/>
+              </a:spcBef>
+              <a:spcAft>
+                <a:spcPts val="0"/>
+              </a:spcAft>
+              <a:buClr>
+                <a:schemeClr val="dk1"/>
+              </a:buClr>
+              <a:buSzPts val="2800"/>
+              <a:buFont typeface="Arial"/>
+              <a:buNone/>
+              <a:defRPr sz="2800" b="0" i="0" u="none" strike="noStrike" cap="none">
+                <a:solidFill>
+                  <a:schemeClr val="dk1"/>
+                </a:solidFill>
+                <a:latin typeface="Arial"/>
+                <a:ea typeface="Arial"/>
+                <a:cs typeface="Arial"/>
+                <a:sym typeface="Arial"/>
+              </a:defRPr>
+            </a:lvl8pPr>
+            <a:lvl9pPr marR="0" lvl="8" algn="l" rtl="0">
+              <a:lnSpc>
+                <a:spcPct val="100000"/>
+              </a:lnSpc>
+              <a:spcBef>
+                <a:spcPts val="0"/>
+              </a:spcBef>
+              <a:spcAft>
+                <a:spcPts val="0"/>
+              </a:spcAft>
+              <a:buClr>
+                <a:schemeClr val="dk1"/>
+              </a:buClr>
+              <a:buSzPts val="2800"/>
+              <a:buFont typeface="Arial"/>
+              <a:buNone/>
+              <a:defRPr sz="2800" b="0" i="0" u="none" strike="noStrike" cap="none">
+                <a:solidFill>
+                  <a:schemeClr val="dk1"/>
+                </a:solidFill>
+                <a:latin typeface="Arial"/>
+                <a:ea typeface="Arial"/>
+                <a:cs typeface="Arial"/>
+                <a:sym typeface="Arial"/>
+              </a:defRPr>
+            </a:lvl9pPr>
+          </a:lstStyle>
+          <a:p>
+            <a:r>
+              <a:rPr lang="en-US" sz="2500" b="1" dirty="0">
+                <a:solidFill>
+                  <a:schemeClr val="tx1"/>
+                </a:solidFill>
+                <a:latin typeface="Montserrat"/>
+                <a:ea typeface="Montserrat"/>
+                <a:cs typeface="Montserrat"/>
+                <a:sym typeface="Montserrat"/>
+              </a:rPr>
+              <a:t>Identify transcripts with significant changes in expression</a:t>
+            </a:r>
+            <a:endParaRPr lang="ru-RU" sz="2500" dirty="0"/>
+          </a:p>
+        </p:txBody>
+      </p:sp>
     </p:spTree>
     <p:extLst>
       <p:ext uri="{BB962C8B-B14F-4D97-AF65-F5344CB8AC3E}">
@@ -7247,6 +7719,566 @@
       </p:grpSpPr>
       <p:pic>
         <p:nvPicPr>
+          <p:cNvPr id="9" name="Рисунок 8" descr="Изображение выглядит как текст, снимок экрана, Прямоугольник, Красочность&#10;&#10;Автоматически созданное описание">
+            <a:extLst>
+              <a:ext uri="{FF2B5EF4-FFF2-40B4-BE49-F238E27FC236}">
+                <a16:creationId xmlns:a16="http://schemas.microsoft.com/office/drawing/2014/main" id="{36D17302-0DC8-464C-966A-2A53170D63D0}"/>
+              </a:ext>
+            </a:extLst>
+          </p:cNvPr>
+          <p:cNvPicPr>
+            <a:picLocks noChangeAspect="1"/>
+          </p:cNvPicPr>
+          <p:nvPr/>
+        </p:nvPicPr>
+        <p:blipFill rotWithShape="1">
+          <a:blip r:embed="rId3"/>
+          <a:srcRect b="9946"/>
+          <a:stretch/>
+        </p:blipFill>
+        <p:spPr>
+          <a:xfrm>
+            <a:off x="4604248" y="1226820"/>
+            <a:ext cx="4349252" cy="3916680"/>
+          </a:xfrm>
+          <a:prstGeom prst="rect">
+            <a:avLst/>
+          </a:prstGeom>
+        </p:spPr>
+      </p:pic>
+      <p:pic>
+        <p:nvPicPr>
+          <p:cNvPr id="10" name="Google Shape;227;p56">
+            <a:extLst>
+              <a:ext uri="{FF2B5EF4-FFF2-40B4-BE49-F238E27FC236}">
+                <a16:creationId xmlns:a16="http://schemas.microsoft.com/office/drawing/2014/main" id="{8A718274-65B1-42D6-A72D-B54A98E9B31E}"/>
+              </a:ext>
+            </a:extLst>
+          </p:cNvPr>
+          <p:cNvPicPr preferRelativeResize="0"/>
+          <p:nvPr/>
+        </p:nvPicPr>
+        <p:blipFill rotWithShape="1">
+          <a:blip r:embed="rId4">
+            <a:alphaModFix amt="27000"/>
+          </a:blip>
+          <a:srcRect r="75555" b="60130"/>
+          <a:stretch/>
+        </p:blipFill>
+        <p:spPr>
+          <a:xfrm>
+            <a:off x="0" y="-9"/>
+            <a:ext cx="2235197" cy="2050707"/>
+          </a:xfrm>
+          <a:prstGeom prst="rect">
+            <a:avLst/>
+          </a:prstGeom>
+          <a:noFill/>
+          <a:ln>
+            <a:noFill/>
+          </a:ln>
+        </p:spPr>
+      </p:pic>
+      <p:sp>
+        <p:nvSpPr>
+          <p:cNvPr id="235" name="Google Shape;235;p56"/>
+          <p:cNvSpPr txBox="1">
+            <a:spLocks noGrp="1"/>
+          </p:cNvSpPr>
+          <p:nvPr>
+            <p:ph type="sldNum" idx="12"/>
+          </p:nvPr>
+        </p:nvSpPr>
+        <p:spPr>
+          <a:xfrm>
+            <a:off x="8472458" y="4663217"/>
+            <a:ext cx="548700" cy="393600"/>
+          </a:xfrm>
+          <a:prstGeom prst="rect">
+            <a:avLst/>
+          </a:prstGeom>
+        </p:spPr>
+        <p:txBody>
+          <a:bodyPr spcFirstLastPara="1" wrap="square" lIns="91425" tIns="91425" rIns="91425" bIns="91425" anchor="ctr" anchorCtr="0">
+            <a:normAutofit/>
+          </a:bodyPr>
+          <a:lstStyle/>
+          <a:p>
+            <a:pPr marL="0" lvl="0" indent="0" algn="r" rtl="0">
+              <a:spcBef>
+                <a:spcPts val="0"/>
+              </a:spcBef>
+              <a:spcAft>
+                <a:spcPts val="0"/>
+              </a:spcAft>
+              <a:buNone/>
+            </a:pPr>
+            <a:fld id="{00000000-1234-1234-1234-123412341234}" type="slidenum">
+              <a:rPr lang="en"/>
+              <a:t>4</a:t>
+            </a:fld>
+            <a:endParaRPr/>
+          </a:p>
+        </p:txBody>
+      </p:sp>
+      <p:pic>
+        <p:nvPicPr>
+          <p:cNvPr id="29" name="Google Shape;230;p56">
+            <a:extLst>
+              <a:ext uri="{FF2B5EF4-FFF2-40B4-BE49-F238E27FC236}">
+                <a16:creationId xmlns:a16="http://schemas.microsoft.com/office/drawing/2014/main" id="{412CA823-03C7-47FF-B224-974EAA9A8C47}"/>
+              </a:ext>
+            </a:extLst>
+          </p:cNvPr>
+          <p:cNvPicPr preferRelativeResize="0"/>
+          <p:nvPr/>
+        </p:nvPicPr>
+        <p:blipFill>
+          <a:blip r:embed="rId5">
+            <a:alphaModFix/>
+          </a:blip>
+          <a:stretch>
+            <a:fillRect/>
+          </a:stretch>
+        </p:blipFill>
+        <p:spPr>
+          <a:xfrm>
+            <a:off x="7040625" y="146800"/>
+            <a:ext cx="1874775" cy="454475"/>
+          </a:xfrm>
+          <a:prstGeom prst="rect">
+            <a:avLst/>
+          </a:prstGeom>
+          <a:noFill/>
+          <a:ln>
+            <a:noFill/>
+          </a:ln>
+        </p:spPr>
+      </p:pic>
+      <p:sp>
+        <p:nvSpPr>
+          <p:cNvPr id="13" name="Заголовок 14">
+            <a:extLst>
+              <a:ext uri="{FF2B5EF4-FFF2-40B4-BE49-F238E27FC236}">
+                <a16:creationId xmlns:a16="http://schemas.microsoft.com/office/drawing/2014/main" id="{BC634FF1-4712-4A0D-86F3-3B12FA7DA07B}"/>
+              </a:ext>
+            </a:extLst>
+          </p:cNvPr>
+          <p:cNvSpPr txBox="1">
+            <a:spLocks/>
+          </p:cNvSpPr>
+          <p:nvPr/>
+        </p:nvSpPr>
+        <p:spPr>
+          <a:xfrm>
+            <a:off x="311700" y="445024"/>
+            <a:ext cx="6728925" cy="835816"/>
+          </a:xfrm>
+          <a:prstGeom prst="rect">
+            <a:avLst/>
+          </a:prstGeom>
+          <a:noFill/>
+          <a:ln>
+            <a:noFill/>
+          </a:ln>
+        </p:spPr>
+        <p:txBody>
+          <a:bodyPr spcFirstLastPara="1" wrap="square" lIns="91425" tIns="91425" rIns="91425" bIns="91425" anchor="t" anchorCtr="0">
+            <a:noAutofit/>
+          </a:bodyPr>
+          <a:lstStyle>
+            <a:defPPr marR="0" lvl="0" algn="l" rtl="0">
+              <a:lnSpc>
+                <a:spcPct val="100000"/>
+              </a:lnSpc>
+              <a:spcBef>
+                <a:spcPts val="0"/>
+              </a:spcBef>
+              <a:spcAft>
+                <a:spcPts val="0"/>
+              </a:spcAft>
+            </a:defPPr>
+            <a:lvl1pPr marR="0" lvl="0" algn="l" rtl="0">
+              <a:lnSpc>
+                <a:spcPct val="100000"/>
+              </a:lnSpc>
+              <a:spcBef>
+                <a:spcPts val="0"/>
+              </a:spcBef>
+              <a:spcAft>
+                <a:spcPts val="0"/>
+              </a:spcAft>
+              <a:buClr>
+                <a:schemeClr val="dk1"/>
+              </a:buClr>
+              <a:buSzPts val="2800"/>
+              <a:buFont typeface="Arial"/>
+              <a:buNone/>
+              <a:defRPr sz="2800" b="0" i="0" u="none" strike="noStrike" cap="none">
+                <a:solidFill>
+                  <a:schemeClr val="dk1"/>
+                </a:solidFill>
+                <a:latin typeface="Arial"/>
+                <a:ea typeface="Arial"/>
+                <a:cs typeface="Arial"/>
+                <a:sym typeface="Arial"/>
+              </a:defRPr>
+            </a:lvl1pPr>
+            <a:lvl2pPr marR="0" lvl="1" algn="l" rtl="0">
+              <a:lnSpc>
+                <a:spcPct val="100000"/>
+              </a:lnSpc>
+              <a:spcBef>
+                <a:spcPts val="0"/>
+              </a:spcBef>
+              <a:spcAft>
+                <a:spcPts val="0"/>
+              </a:spcAft>
+              <a:buClr>
+                <a:schemeClr val="dk1"/>
+              </a:buClr>
+              <a:buSzPts val="2800"/>
+              <a:buFont typeface="Arial"/>
+              <a:buNone/>
+              <a:defRPr sz="2800" b="0" i="0" u="none" strike="noStrike" cap="none">
+                <a:solidFill>
+                  <a:schemeClr val="dk1"/>
+                </a:solidFill>
+                <a:latin typeface="Arial"/>
+                <a:ea typeface="Arial"/>
+                <a:cs typeface="Arial"/>
+                <a:sym typeface="Arial"/>
+              </a:defRPr>
+            </a:lvl2pPr>
+            <a:lvl3pPr marR="0" lvl="2" algn="l" rtl="0">
+              <a:lnSpc>
+                <a:spcPct val="100000"/>
+              </a:lnSpc>
+              <a:spcBef>
+                <a:spcPts val="0"/>
+              </a:spcBef>
+              <a:spcAft>
+                <a:spcPts val="0"/>
+              </a:spcAft>
+              <a:buClr>
+                <a:schemeClr val="dk1"/>
+              </a:buClr>
+              <a:buSzPts val="2800"/>
+              <a:buFont typeface="Arial"/>
+              <a:buNone/>
+              <a:defRPr sz="2800" b="0" i="0" u="none" strike="noStrike" cap="none">
+                <a:solidFill>
+                  <a:schemeClr val="dk1"/>
+                </a:solidFill>
+                <a:latin typeface="Arial"/>
+                <a:ea typeface="Arial"/>
+                <a:cs typeface="Arial"/>
+                <a:sym typeface="Arial"/>
+              </a:defRPr>
+            </a:lvl3pPr>
+            <a:lvl4pPr marR="0" lvl="3" algn="l" rtl="0">
+              <a:lnSpc>
+                <a:spcPct val="100000"/>
+              </a:lnSpc>
+              <a:spcBef>
+                <a:spcPts val="0"/>
+              </a:spcBef>
+              <a:spcAft>
+                <a:spcPts val="0"/>
+              </a:spcAft>
+              <a:buClr>
+                <a:schemeClr val="dk1"/>
+              </a:buClr>
+              <a:buSzPts val="2800"/>
+              <a:buFont typeface="Arial"/>
+              <a:buNone/>
+              <a:defRPr sz="2800" b="0" i="0" u="none" strike="noStrike" cap="none">
+                <a:solidFill>
+                  <a:schemeClr val="dk1"/>
+                </a:solidFill>
+                <a:latin typeface="Arial"/>
+                <a:ea typeface="Arial"/>
+                <a:cs typeface="Arial"/>
+                <a:sym typeface="Arial"/>
+              </a:defRPr>
+            </a:lvl4pPr>
+            <a:lvl5pPr marR="0" lvl="4" algn="l" rtl="0">
+              <a:lnSpc>
+                <a:spcPct val="100000"/>
+              </a:lnSpc>
+              <a:spcBef>
+                <a:spcPts val="0"/>
+              </a:spcBef>
+              <a:spcAft>
+                <a:spcPts val="0"/>
+              </a:spcAft>
+              <a:buClr>
+                <a:schemeClr val="dk1"/>
+              </a:buClr>
+              <a:buSzPts val="2800"/>
+              <a:buFont typeface="Arial"/>
+              <a:buNone/>
+              <a:defRPr sz="2800" b="0" i="0" u="none" strike="noStrike" cap="none">
+                <a:solidFill>
+                  <a:schemeClr val="dk1"/>
+                </a:solidFill>
+                <a:latin typeface="Arial"/>
+                <a:ea typeface="Arial"/>
+                <a:cs typeface="Arial"/>
+                <a:sym typeface="Arial"/>
+              </a:defRPr>
+            </a:lvl5pPr>
+            <a:lvl6pPr marR="0" lvl="5" algn="l" rtl="0">
+              <a:lnSpc>
+                <a:spcPct val="100000"/>
+              </a:lnSpc>
+              <a:spcBef>
+                <a:spcPts val="0"/>
+              </a:spcBef>
+              <a:spcAft>
+                <a:spcPts val="0"/>
+              </a:spcAft>
+              <a:buClr>
+                <a:schemeClr val="dk1"/>
+              </a:buClr>
+              <a:buSzPts val="2800"/>
+              <a:buFont typeface="Arial"/>
+              <a:buNone/>
+              <a:defRPr sz="2800" b="0" i="0" u="none" strike="noStrike" cap="none">
+                <a:solidFill>
+                  <a:schemeClr val="dk1"/>
+                </a:solidFill>
+                <a:latin typeface="Arial"/>
+                <a:ea typeface="Arial"/>
+                <a:cs typeface="Arial"/>
+                <a:sym typeface="Arial"/>
+              </a:defRPr>
+            </a:lvl6pPr>
+            <a:lvl7pPr marR="0" lvl="6" algn="l" rtl="0">
+              <a:lnSpc>
+                <a:spcPct val="100000"/>
+              </a:lnSpc>
+              <a:spcBef>
+                <a:spcPts val="0"/>
+              </a:spcBef>
+              <a:spcAft>
+                <a:spcPts val="0"/>
+              </a:spcAft>
+              <a:buClr>
+                <a:schemeClr val="dk1"/>
+              </a:buClr>
+              <a:buSzPts val="2800"/>
+              <a:buFont typeface="Arial"/>
+              <a:buNone/>
+              <a:defRPr sz="2800" b="0" i="0" u="none" strike="noStrike" cap="none">
+                <a:solidFill>
+                  <a:schemeClr val="dk1"/>
+                </a:solidFill>
+                <a:latin typeface="Arial"/>
+                <a:ea typeface="Arial"/>
+                <a:cs typeface="Arial"/>
+                <a:sym typeface="Arial"/>
+              </a:defRPr>
+            </a:lvl7pPr>
+            <a:lvl8pPr marR="0" lvl="7" algn="l" rtl="0">
+              <a:lnSpc>
+                <a:spcPct val="100000"/>
+              </a:lnSpc>
+              <a:spcBef>
+                <a:spcPts val="0"/>
+              </a:spcBef>
+              <a:spcAft>
+                <a:spcPts val="0"/>
+              </a:spcAft>
+              <a:buClr>
+                <a:schemeClr val="dk1"/>
+              </a:buClr>
+              <a:buSzPts val="2800"/>
+              <a:buFont typeface="Arial"/>
+              <a:buNone/>
+              <a:defRPr sz="2800" b="0" i="0" u="none" strike="noStrike" cap="none">
+                <a:solidFill>
+                  <a:schemeClr val="dk1"/>
+                </a:solidFill>
+                <a:latin typeface="Arial"/>
+                <a:ea typeface="Arial"/>
+                <a:cs typeface="Arial"/>
+                <a:sym typeface="Arial"/>
+              </a:defRPr>
+            </a:lvl8pPr>
+            <a:lvl9pPr marR="0" lvl="8" algn="l" rtl="0">
+              <a:lnSpc>
+                <a:spcPct val="100000"/>
+              </a:lnSpc>
+              <a:spcBef>
+                <a:spcPts val="0"/>
+              </a:spcBef>
+              <a:spcAft>
+                <a:spcPts val="0"/>
+              </a:spcAft>
+              <a:buClr>
+                <a:schemeClr val="dk1"/>
+              </a:buClr>
+              <a:buSzPts val="2800"/>
+              <a:buFont typeface="Arial"/>
+              <a:buNone/>
+              <a:defRPr sz="2800" b="0" i="0" u="none" strike="noStrike" cap="none">
+                <a:solidFill>
+                  <a:schemeClr val="dk1"/>
+                </a:solidFill>
+                <a:latin typeface="Arial"/>
+                <a:ea typeface="Arial"/>
+                <a:cs typeface="Arial"/>
+                <a:sym typeface="Arial"/>
+              </a:defRPr>
+            </a:lvl9pPr>
+          </a:lstStyle>
+          <a:p>
+            <a:r>
+              <a:rPr lang="en-US" sz="2500" b="1" dirty="0">
+                <a:solidFill>
+                  <a:schemeClr val="tx1"/>
+                </a:solidFill>
+                <a:latin typeface="Montserrat"/>
+                <a:ea typeface="Montserrat"/>
+                <a:cs typeface="Montserrat"/>
+                <a:sym typeface="Montserrat"/>
+              </a:rPr>
+              <a:t>Identify 100 transcripts with most remarkable upregulation in expression</a:t>
+            </a:r>
+            <a:endParaRPr lang="ru-RU" sz="2500" dirty="0"/>
+          </a:p>
+        </p:txBody>
+      </p:sp>
+      <p:sp>
+        <p:nvSpPr>
+          <p:cNvPr id="11" name="TextBox 10">
+            <a:extLst>
+              <a:ext uri="{FF2B5EF4-FFF2-40B4-BE49-F238E27FC236}">
+                <a16:creationId xmlns:a16="http://schemas.microsoft.com/office/drawing/2014/main" id="{25DCB396-73BD-4A83-BB15-290379BCA95E}"/>
+              </a:ext>
+            </a:extLst>
+          </p:cNvPr>
+          <p:cNvSpPr txBox="1"/>
+          <p:nvPr/>
+        </p:nvSpPr>
+        <p:spPr>
+          <a:xfrm>
+            <a:off x="124811" y="1550293"/>
+            <a:ext cx="4048876" cy="2308324"/>
+          </a:xfrm>
+          <a:prstGeom prst="rect">
+            <a:avLst/>
+          </a:prstGeom>
+          <a:noFill/>
+        </p:spPr>
+        <p:txBody>
+          <a:bodyPr wrap="square" rtlCol="0">
+            <a:spAutoFit/>
+          </a:bodyPr>
+          <a:lstStyle/>
+          <a:p>
+            <a:pPr marL="285750" indent="-285750">
+              <a:buFont typeface="Arial" panose="020B0604020202020204" pitchFamily="34" charset="0"/>
+              <a:buChar char="•"/>
+            </a:pPr>
+            <a:r>
+              <a:rPr lang="en-US" sz="1800" dirty="0">
+                <a:solidFill>
+                  <a:srgbClr val="000000"/>
+                </a:solidFill>
+                <a:effectLst/>
+                <a:latin typeface="Times New Roman" panose="02020603050405020304" pitchFamily="18" charset="0"/>
+                <a:ea typeface="Times New Roman" panose="02020603050405020304" pitchFamily="18" charset="0"/>
+              </a:rPr>
+              <a:t>Top-100 transcripts with downregulation in expression predominantly corresponded to genes of different types of collagens (5 transcripts in total)</a:t>
+            </a:r>
+          </a:p>
+          <a:p>
+            <a:pPr marL="285750" indent="-285750">
+              <a:buFont typeface="Arial" panose="020B0604020202020204" pitchFamily="34" charset="0"/>
+              <a:buChar char="•"/>
+            </a:pPr>
+            <a:r>
+              <a:rPr lang="en-US" sz="1800" dirty="0">
+                <a:solidFill>
+                  <a:srgbClr val="000000"/>
+                </a:solidFill>
+                <a:effectLst/>
+                <a:latin typeface="Times New Roman" panose="02020603050405020304" pitchFamily="18" charset="0"/>
+                <a:ea typeface="Times New Roman" panose="02020603050405020304" pitchFamily="18" charset="0"/>
+              </a:rPr>
+              <a:t>They also include members of Notch signaling pathway (4 transcripts in total)</a:t>
+            </a:r>
+            <a:endParaRPr lang="ru-RU" dirty="0"/>
+          </a:p>
+        </p:txBody>
+      </p:sp>
+    </p:spTree>
+    <p:extLst>
+      <p:ext uri="{BB962C8B-B14F-4D97-AF65-F5344CB8AC3E}">
+        <p14:creationId xmlns:p14="http://schemas.microsoft.com/office/powerpoint/2010/main" val="514330690"/>
+      </p:ext>
+    </p:extLst>
+  </p:cSld>
+  <p:clrMapOvr>
+    <a:masterClrMapping/>
+  </p:clrMapOvr>
+</p:sld>
+</file>
+
+<file path=ppt/slides/slide5.xml><?xml version="1.0" encoding="utf-8"?>
+<p:sld xmlns:a="http://schemas.openxmlformats.org/drawingml/2006/main" xmlns:r="http://schemas.openxmlformats.org/officeDocument/2006/relationships" xmlns:p="http://schemas.openxmlformats.org/presentationml/2006/main">
+  <p:cSld>
+    <p:spTree>
+      <p:nvGrpSpPr>
+        <p:cNvPr id="1" name="Shape 225"/>
+        <p:cNvGrpSpPr/>
+        <p:nvPr/>
+      </p:nvGrpSpPr>
+      <p:grpSpPr>
+        <a:xfrm>
+          <a:off x="0" y="0"/>
+          <a:ext cx="0" cy="0"/>
+          <a:chOff x="0" y="0"/>
+          <a:chExt cx="0" cy="0"/>
+        </a:xfrm>
+      </p:grpSpPr>
+      <p:pic>
+        <p:nvPicPr>
+          <p:cNvPr id="10" name="Google Shape;227;p56">
+            <a:extLst>
+              <a:ext uri="{FF2B5EF4-FFF2-40B4-BE49-F238E27FC236}">
+                <a16:creationId xmlns:a16="http://schemas.microsoft.com/office/drawing/2014/main" id="{8A718274-65B1-42D6-A72D-B54A98E9B31E}"/>
+              </a:ext>
+            </a:extLst>
+          </p:cNvPr>
+          <p:cNvPicPr preferRelativeResize="0"/>
+          <p:nvPr/>
+        </p:nvPicPr>
+        <p:blipFill rotWithShape="1">
+          <a:blip r:embed="rId3">
+            <a:alphaModFix amt="27000"/>
+          </a:blip>
+          <a:srcRect r="75555" b="60130"/>
+          <a:stretch/>
+        </p:blipFill>
+        <p:spPr>
+          <a:xfrm>
+            <a:off x="0" y="-9"/>
+            <a:ext cx="2235197" cy="2050707"/>
+          </a:xfrm>
+          <a:prstGeom prst="rect">
+            <a:avLst/>
+          </a:prstGeom>
+          <a:noFill/>
+          <a:ln>
+            <a:noFill/>
+          </a:ln>
+        </p:spPr>
+      </p:pic>
+      <p:pic>
+        <p:nvPicPr>
           <p:cNvPr id="19" name="Рисунок 18" descr="Изображение выглядит как текст, снимок экрана, Красочность, Прямоугольник&#10;&#10;Автоматически созданное описание">
             <a:extLst>
               <a:ext uri="{FF2B5EF4-FFF2-40B4-BE49-F238E27FC236}">
@@ -7260,7 +8292,7 @@
           <p:nvPr/>
         </p:nvPicPr>
         <p:blipFill rotWithShape="1">
-          <a:blip r:embed="rId3"/>
+          <a:blip r:embed="rId4"/>
           <a:srcRect b="9946"/>
           <a:stretch/>
         </p:blipFill>
@@ -7310,7 +8342,7 @@
             </a:pPr>
             <a:fld id="{00000000-1234-1234-1234-123412341234}" type="slidenum">
               <a:rPr lang="en"/>
-              <a:t>4</a:t>
+              <a:t>5</a:t>
             </a:fld>
             <a:endParaRPr/>
           </a:p>
@@ -7322,6 +8354,835 @@
             <a:extLst>
               <a:ext uri="{FF2B5EF4-FFF2-40B4-BE49-F238E27FC236}">
                 <a16:creationId xmlns:a16="http://schemas.microsoft.com/office/drawing/2014/main" id="{412CA823-03C7-47FF-B224-974EAA9A8C47}"/>
+              </a:ext>
+            </a:extLst>
+          </p:cNvPr>
+          <p:cNvPicPr preferRelativeResize="0"/>
+          <p:nvPr/>
+        </p:nvPicPr>
+        <p:blipFill>
+          <a:blip r:embed="rId5">
+            <a:alphaModFix/>
+          </a:blip>
+          <a:stretch>
+            <a:fillRect/>
+          </a:stretch>
+        </p:blipFill>
+        <p:spPr>
+          <a:xfrm>
+            <a:off x="7040625" y="146800"/>
+            <a:ext cx="1874775" cy="454475"/>
+          </a:xfrm>
+          <a:prstGeom prst="rect">
+            <a:avLst/>
+          </a:prstGeom>
+          <a:noFill/>
+          <a:ln>
+            <a:noFill/>
+          </a:ln>
+        </p:spPr>
+      </p:pic>
+      <p:sp>
+        <p:nvSpPr>
+          <p:cNvPr id="13" name="Заголовок 14">
+            <a:extLst>
+              <a:ext uri="{FF2B5EF4-FFF2-40B4-BE49-F238E27FC236}">
+                <a16:creationId xmlns:a16="http://schemas.microsoft.com/office/drawing/2014/main" id="{BC634FF1-4712-4A0D-86F3-3B12FA7DA07B}"/>
+              </a:ext>
+            </a:extLst>
+          </p:cNvPr>
+          <p:cNvSpPr txBox="1">
+            <a:spLocks/>
+          </p:cNvSpPr>
+          <p:nvPr/>
+        </p:nvSpPr>
+        <p:spPr>
+          <a:xfrm>
+            <a:off x="311700" y="445024"/>
+            <a:ext cx="7194000" cy="835816"/>
+          </a:xfrm>
+          <a:prstGeom prst="rect">
+            <a:avLst/>
+          </a:prstGeom>
+          <a:noFill/>
+          <a:ln>
+            <a:noFill/>
+          </a:ln>
+        </p:spPr>
+        <p:txBody>
+          <a:bodyPr spcFirstLastPara="1" wrap="square" lIns="91425" tIns="91425" rIns="91425" bIns="91425" anchor="t" anchorCtr="0">
+            <a:noAutofit/>
+          </a:bodyPr>
+          <a:lstStyle>
+            <a:defPPr marR="0" lvl="0" algn="l" rtl="0">
+              <a:lnSpc>
+                <a:spcPct val="100000"/>
+              </a:lnSpc>
+              <a:spcBef>
+                <a:spcPts val="0"/>
+              </a:spcBef>
+              <a:spcAft>
+                <a:spcPts val="0"/>
+              </a:spcAft>
+            </a:defPPr>
+            <a:lvl1pPr marR="0" lvl="0" algn="l" rtl="0">
+              <a:lnSpc>
+                <a:spcPct val="100000"/>
+              </a:lnSpc>
+              <a:spcBef>
+                <a:spcPts val="0"/>
+              </a:spcBef>
+              <a:spcAft>
+                <a:spcPts val="0"/>
+              </a:spcAft>
+              <a:buClr>
+                <a:schemeClr val="dk1"/>
+              </a:buClr>
+              <a:buSzPts val="2800"/>
+              <a:buFont typeface="Arial"/>
+              <a:buNone/>
+              <a:defRPr sz="2800" b="0" i="0" u="none" strike="noStrike" cap="none">
+                <a:solidFill>
+                  <a:schemeClr val="dk1"/>
+                </a:solidFill>
+                <a:latin typeface="Arial"/>
+                <a:ea typeface="Arial"/>
+                <a:cs typeface="Arial"/>
+                <a:sym typeface="Arial"/>
+              </a:defRPr>
+            </a:lvl1pPr>
+            <a:lvl2pPr marR="0" lvl="1" algn="l" rtl="0">
+              <a:lnSpc>
+                <a:spcPct val="100000"/>
+              </a:lnSpc>
+              <a:spcBef>
+                <a:spcPts val="0"/>
+              </a:spcBef>
+              <a:spcAft>
+                <a:spcPts val="0"/>
+              </a:spcAft>
+              <a:buClr>
+                <a:schemeClr val="dk1"/>
+              </a:buClr>
+              <a:buSzPts val="2800"/>
+              <a:buFont typeface="Arial"/>
+              <a:buNone/>
+              <a:defRPr sz="2800" b="0" i="0" u="none" strike="noStrike" cap="none">
+                <a:solidFill>
+                  <a:schemeClr val="dk1"/>
+                </a:solidFill>
+                <a:latin typeface="Arial"/>
+                <a:ea typeface="Arial"/>
+                <a:cs typeface="Arial"/>
+                <a:sym typeface="Arial"/>
+              </a:defRPr>
+            </a:lvl2pPr>
+            <a:lvl3pPr marR="0" lvl="2" algn="l" rtl="0">
+              <a:lnSpc>
+                <a:spcPct val="100000"/>
+              </a:lnSpc>
+              <a:spcBef>
+                <a:spcPts val="0"/>
+              </a:spcBef>
+              <a:spcAft>
+                <a:spcPts val="0"/>
+              </a:spcAft>
+              <a:buClr>
+                <a:schemeClr val="dk1"/>
+              </a:buClr>
+              <a:buSzPts val="2800"/>
+              <a:buFont typeface="Arial"/>
+              <a:buNone/>
+              <a:defRPr sz="2800" b="0" i="0" u="none" strike="noStrike" cap="none">
+                <a:solidFill>
+                  <a:schemeClr val="dk1"/>
+                </a:solidFill>
+                <a:latin typeface="Arial"/>
+                <a:ea typeface="Arial"/>
+                <a:cs typeface="Arial"/>
+                <a:sym typeface="Arial"/>
+              </a:defRPr>
+            </a:lvl3pPr>
+            <a:lvl4pPr marR="0" lvl="3" algn="l" rtl="0">
+              <a:lnSpc>
+                <a:spcPct val="100000"/>
+              </a:lnSpc>
+              <a:spcBef>
+                <a:spcPts val="0"/>
+              </a:spcBef>
+              <a:spcAft>
+                <a:spcPts val="0"/>
+              </a:spcAft>
+              <a:buClr>
+                <a:schemeClr val="dk1"/>
+              </a:buClr>
+              <a:buSzPts val="2800"/>
+              <a:buFont typeface="Arial"/>
+              <a:buNone/>
+              <a:defRPr sz="2800" b="0" i="0" u="none" strike="noStrike" cap="none">
+                <a:solidFill>
+                  <a:schemeClr val="dk1"/>
+                </a:solidFill>
+                <a:latin typeface="Arial"/>
+                <a:ea typeface="Arial"/>
+                <a:cs typeface="Arial"/>
+                <a:sym typeface="Arial"/>
+              </a:defRPr>
+            </a:lvl4pPr>
+            <a:lvl5pPr marR="0" lvl="4" algn="l" rtl="0">
+              <a:lnSpc>
+                <a:spcPct val="100000"/>
+              </a:lnSpc>
+              <a:spcBef>
+                <a:spcPts val="0"/>
+              </a:spcBef>
+              <a:spcAft>
+                <a:spcPts val="0"/>
+              </a:spcAft>
+              <a:buClr>
+                <a:schemeClr val="dk1"/>
+              </a:buClr>
+              <a:buSzPts val="2800"/>
+              <a:buFont typeface="Arial"/>
+              <a:buNone/>
+              <a:defRPr sz="2800" b="0" i="0" u="none" strike="noStrike" cap="none">
+                <a:solidFill>
+                  <a:schemeClr val="dk1"/>
+                </a:solidFill>
+                <a:latin typeface="Arial"/>
+                <a:ea typeface="Arial"/>
+                <a:cs typeface="Arial"/>
+                <a:sym typeface="Arial"/>
+              </a:defRPr>
+            </a:lvl5pPr>
+            <a:lvl6pPr marR="0" lvl="5" algn="l" rtl="0">
+              <a:lnSpc>
+                <a:spcPct val="100000"/>
+              </a:lnSpc>
+              <a:spcBef>
+                <a:spcPts val="0"/>
+              </a:spcBef>
+              <a:spcAft>
+                <a:spcPts val="0"/>
+              </a:spcAft>
+              <a:buClr>
+                <a:schemeClr val="dk1"/>
+              </a:buClr>
+              <a:buSzPts val="2800"/>
+              <a:buFont typeface="Arial"/>
+              <a:buNone/>
+              <a:defRPr sz="2800" b="0" i="0" u="none" strike="noStrike" cap="none">
+                <a:solidFill>
+                  <a:schemeClr val="dk1"/>
+                </a:solidFill>
+                <a:latin typeface="Arial"/>
+                <a:ea typeface="Arial"/>
+                <a:cs typeface="Arial"/>
+                <a:sym typeface="Arial"/>
+              </a:defRPr>
+            </a:lvl6pPr>
+            <a:lvl7pPr marR="0" lvl="6" algn="l" rtl="0">
+              <a:lnSpc>
+                <a:spcPct val="100000"/>
+              </a:lnSpc>
+              <a:spcBef>
+                <a:spcPts val="0"/>
+              </a:spcBef>
+              <a:spcAft>
+                <a:spcPts val="0"/>
+              </a:spcAft>
+              <a:buClr>
+                <a:schemeClr val="dk1"/>
+              </a:buClr>
+              <a:buSzPts val="2800"/>
+              <a:buFont typeface="Arial"/>
+              <a:buNone/>
+              <a:defRPr sz="2800" b="0" i="0" u="none" strike="noStrike" cap="none">
+                <a:solidFill>
+                  <a:schemeClr val="dk1"/>
+                </a:solidFill>
+                <a:latin typeface="Arial"/>
+                <a:ea typeface="Arial"/>
+                <a:cs typeface="Arial"/>
+                <a:sym typeface="Arial"/>
+              </a:defRPr>
+            </a:lvl7pPr>
+            <a:lvl8pPr marR="0" lvl="7" algn="l" rtl="0">
+              <a:lnSpc>
+                <a:spcPct val="100000"/>
+              </a:lnSpc>
+              <a:spcBef>
+                <a:spcPts val="0"/>
+              </a:spcBef>
+              <a:spcAft>
+                <a:spcPts val="0"/>
+              </a:spcAft>
+              <a:buClr>
+                <a:schemeClr val="dk1"/>
+              </a:buClr>
+              <a:buSzPts val="2800"/>
+              <a:buFont typeface="Arial"/>
+              <a:buNone/>
+              <a:defRPr sz="2800" b="0" i="0" u="none" strike="noStrike" cap="none">
+                <a:solidFill>
+                  <a:schemeClr val="dk1"/>
+                </a:solidFill>
+                <a:latin typeface="Arial"/>
+                <a:ea typeface="Arial"/>
+                <a:cs typeface="Arial"/>
+                <a:sym typeface="Arial"/>
+              </a:defRPr>
+            </a:lvl8pPr>
+            <a:lvl9pPr marR="0" lvl="8" algn="l" rtl="0">
+              <a:lnSpc>
+                <a:spcPct val="100000"/>
+              </a:lnSpc>
+              <a:spcBef>
+                <a:spcPts val="0"/>
+              </a:spcBef>
+              <a:spcAft>
+                <a:spcPts val="0"/>
+              </a:spcAft>
+              <a:buClr>
+                <a:schemeClr val="dk1"/>
+              </a:buClr>
+              <a:buSzPts val="2800"/>
+              <a:buFont typeface="Arial"/>
+              <a:buNone/>
+              <a:defRPr sz="2800" b="0" i="0" u="none" strike="noStrike" cap="none">
+                <a:solidFill>
+                  <a:schemeClr val="dk1"/>
+                </a:solidFill>
+                <a:latin typeface="Arial"/>
+                <a:ea typeface="Arial"/>
+                <a:cs typeface="Arial"/>
+                <a:sym typeface="Arial"/>
+              </a:defRPr>
+            </a:lvl9pPr>
+          </a:lstStyle>
+          <a:p>
+            <a:r>
+              <a:rPr lang="en-US" sz="2500" b="1" dirty="0">
+                <a:solidFill>
+                  <a:schemeClr val="tx1"/>
+                </a:solidFill>
+                <a:latin typeface="Montserrat"/>
+                <a:ea typeface="Montserrat"/>
+                <a:cs typeface="Montserrat"/>
+                <a:sym typeface="Montserrat"/>
+              </a:rPr>
+              <a:t>Identify 100 transcripts with most remarkable downregulation in expression</a:t>
+            </a:r>
+            <a:endParaRPr lang="ru-RU" sz="2500" dirty="0"/>
+          </a:p>
+        </p:txBody>
+      </p:sp>
+      <p:sp>
+        <p:nvSpPr>
+          <p:cNvPr id="14" name="TextBox 13">
+            <a:extLst>
+              <a:ext uri="{FF2B5EF4-FFF2-40B4-BE49-F238E27FC236}">
+                <a16:creationId xmlns:a16="http://schemas.microsoft.com/office/drawing/2014/main" id="{1F97196B-D8F5-45C5-9E35-28E741CFDE8B}"/>
+              </a:ext>
+            </a:extLst>
+          </p:cNvPr>
+          <p:cNvSpPr txBox="1"/>
+          <p:nvPr/>
+        </p:nvSpPr>
+        <p:spPr>
+          <a:xfrm>
+            <a:off x="124811" y="1550293"/>
+            <a:ext cx="4048876" cy="1200329"/>
+          </a:xfrm>
+          <a:prstGeom prst="rect">
+            <a:avLst/>
+          </a:prstGeom>
+          <a:noFill/>
+        </p:spPr>
+        <p:txBody>
+          <a:bodyPr wrap="square" rtlCol="0">
+            <a:spAutoFit/>
+          </a:bodyPr>
+          <a:lstStyle/>
+          <a:p>
+            <a:pPr marL="285750" indent="-285750">
+              <a:buFont typeface="Arial" panose="020B0604020202020204" pitchFamily="34" charset="0"/>
+              <a:buChar char="•"/>
+            </a:pPr>
+            <a:r>
+              <a:rPr lang="en-US" sz="1800" dirty="0">
+                <a:solidFill>
+                  <a:srgbClr val="000000"/>
+                </a:solidFill>
+                <a:effectLst/>
+                <a:latin typeface="Times New Roman" panose="02020603050405020304" pitchFamily="18" charset="0"/>
+                <a:ea typeface="Times New Roman" panose="02020603050405020304" pitchFamily="18" charset="0"/>
+              </a:rPr>
+              <a:t>Among the top-100 transcripts with upregulation in expression, we identified members of </a:t>
+            </a:r>
+            <a:r>
+              <a:rPr lang="en-US" sz="1800" dirty="0" err="1">
+                <a:solidFill>
+                  <a:srgbClr val="000000"/>
+                </a:solidFill>
+                <a:effectLst/>
+                <a:latin typeface="Times New Roman" panose="02020603050405020304" pitchFamily="18" charset="0"/>
+                <a:ea typeface="Times New Roman" panose="02020603050405020304" pitchFamily="18" charset="0"/>
+              </a:rPr>
+              <a:t>cWnt</a:t>
+            </a:r>
+            <a:r>
+              <a:rPr lang="en-US" sz="1800" dirty="0">
+                <a:solidFill>
+                  <a:srgbClr val="000000"/>
+                </a:solidFill>
+                <a:effectLst/>
+                <a:latin typeface="Times New Roman" panose="02020603050405020304" pitchFamily="18" charset="0"/>
+                <a:ea typeface="Times New Roman" panose="02020603050405020304" pitchFamily="18" charset="0"/>
+              </a:rPr>
+              <a:t> pathway (8 transcripts in total).</a:t>
+            </a:r>
+            <a:endParaRPr lang="ru-RU" dirty="0"/>
+          </a:p>
+        </p:txBody>
+      </p:sp>
+    </p:spTree>
+    <p:extLst>
+      <p:ext uri="{BB962C8B-B14F-4D97-AF65-F5344CB8AC3E}">
+        <p14:creationId xmlns:p14="http://schemas.microsoft.com/office/powerpoint/2010/main" val="1475169408"/>
+      </p:ext>
+    </p:extLst>
+  </p:cSld>
+  <p:clrMapOvr>
+    <a:masterClrMapping/>
+  </p:clrMapOvr>
+</p:sld>
+</file>
+
+<file path=ppt/slides/slide6.xml><?xml version="1.0" encoding="utf-8"?>
+<p:sld xmlns:a="http://schemas.openxmlformats.org/drawingml/2006/main" xmlns:r="http://schemas.openxmlformats.org/officeDocument/2006/relationships" xmlns:p="http://schemas.openxmlformats.org/presentationml/2006/main">
+  <p:cSld>
+    <p:spTree>
+      <p:nvGrpSpPr>
+        <p:cNvPr id="1" name=""/>
+        <p:cNvGrpSpPr/>
+        <p:nvPr/>
+      </p:nvGrpSpPr>
+      <p:grpSpPr>
+        <a:xfrm>
+          <a:off x="0" y="0"/>
+          <a:ext cx="0" cy="0"/>
+          <a:chOff x="0" y="0"/>
+          <a:chExt cx="0" cy="0"/>
+        </a:xfrm>
+      </p:grpSpPr>
+      <p:pic>
+        <p:nvPicPr>
+          <p:cNvPr id="10" name="Google Shape;227;p56">
+            <a:extLst>
+              <a:ext uri="{FF2B5EF4-FFF2-40B4-BE49-F238E27FC236}">
+                <a16:creationId xmlns:a16="http://schemas.microsoft.com/office/drawing/2014/main" id="{AFCF5A6B-864B-4CE1-BC77-3FF116A43B86}"/>
+              </a:ext>
+            </a:extLst>
+          </p:cNvPr>
+          <p:cNvPicPr preferRelativeResize="0"/>
+          <p:nvPr/>
+        </p:nvPicPr>
+        <p:blipFill rotWithShape="1">
+          <a:blip r:embed="rId2">
+            <a:alphaModFix amt="27000"/>
+          </a:blip>
+          <a:srcRect r="75555" b="60130"/>
+          <a:stretch/>
+        </p:blipFill>
+        <p:spPr>
+          <a:xfrm>
+            <a:off x="0" y="-9"/>
+            <a:ext cx="2235197" cy="2050707"/>
+          </a:xfrm>
+          <a:prstGeom prst="rect">
+            <a:avLst/>
+          </a:prstGeom>
+          <a:noFill/>
+          <a:ln>
+            <a:noFill/>
+          </a:ln>
+        </p:spPr>
+      </p:pic>
+      <p:sp>
+        <p:nvSpPr>
+          <p:cNvPr id="3" name="Текст 2">
+            <a:extLst>
+              <a:ext uri="{FF2B5EF4-FFF2-40B4-BE49-F238E27FC236}">
+                <a16:creationId xmlns:a16="http://schemas.microsoft.com/office/drawing/2014/main" id="{CDC549BD-6CC7-4F22-AC66-48EE6EDD1D06}"/>
+              </a:ext>
+            </a:extLst>
+          </p:cNvPr>
+          <p:cNvSpPr>
+            <a:spLocks noGrp="1"/>
+          </p:cNvSpPr>
+          <p:nvPr>
+            <p:ph type="body" idx="1"/>
+          </p:nvPr>
+        </p:nvSpPr>
+        <p:spPr/>
+        <p:txBody>
+          <a:bodyPr/>
+          <a:lstStyle/>
+          <a:p>
+            <a:r>
+              <a:rPr lang="en-US" dirty="0">
+                <a:solidFill>
+                  <a:schemeClr val="tx1"/>
+                </a:solidFill>
+              </a:rPr>
+              <a:t>Code, workflow details and processed data available in project repository:</a:t>
+            </a:r>
+          </a:p>
+          <a:p>
+            <a:pPr marL="114300" indent="0">
+              <a:buNone/>
+            </a:pPr>
+            <a:r>
+              <a:rPr lang="ru-RU" dirty="0">
+                <a:solidFill>
+                  <a:srgbClr val="0097A7"/>
+                </a:solidFill>
+              </a:rPr>
+              <a:t>https://github.com/angrygeese/DynamenaProject_BI2023-24/tree/main</a:t>
+            </a:r>
+            <a:endParaRPr lang="ru-RU" dirty="0"/>
+          </a:p>
+        </p:txBody>
+      </p:sp>
+      <p:pic>
+        <p:nvPicPr>
+          <p:cNvPr id="5" name="Рисунок 4" descr="Изображение выглядит как графическая вставка, символ, Графика, дизайн&#10;&#10;Автоматически созданное описание">
+            <a:extLst>
+              <a:ext uri="{FF2B5EF4-FFF2-40B4-BE49-F238E27FC236}">
+                <a16:creationId xmlns:a16="http://schemas.microsoft.com/office/drawing/2014/main" id="{4AA447AD-23C9-4C15-8F8B-9A4BAFEB40AA}"/>
+              </a:ext>
+            </a:extLst>
+          </p:cNvPr>
+          <p:cNvPicPr>
+            <a:picLocks noChangeAspect="1"/>
+          </p:cNvPicPr>
+          <p:nvPr/>
+        </p:nvPicPr>
+        <p:blipFill>
+          <a:blip r:embed="rId3"/>
+          <a:stretch>
+            <a:fillRect/>
+          </a:stretch>
+        </p:blipFill>
+        <p:spPr>
+          <a:xfrm>
+            <a:off x="3331576" y="2050862"/>
+            <a:ext cx="2480847" cy="2480847"/>
+          </a:xfrm>
+          <a:prstGeom prst="rect">
+            <a:avLst/>
+          </a:prstGeom>
+        </p:spPr>
+      </p:pic>
+      <p:sp>
+        <p:nvSpPr>
+          <p:cNvPr id="7" name="Заголовок 14">
+            <a:extLst>
+              <a:ext uri="{FF2B5EF4-FFF2-40B4-BE49-F238E27FC236}">
+                <a16:creationId xmlns:a16="http://schemas.microsoft.com/office/drawing/2014/main" id="{0FE24F5E-F9A0-4750-A849-94554DE35715}"/>
+              </a:ext>
+            </a:extLst>
+          </p:cNvPr>
+          <p:cNvSpPr txBox="1">
+            <a:spLocks/>
+          </p:cNvSpPr>
+          <p:nvPr/>
+        </p:nvSpPr>
+        <p:spPr>
+          <a:xfrm>
+            <a:off x="311700" y="445024"/>
+            <a:ext cx="6405106" cy="753173"/>
+          </a:xfrm>
+          <a:prstGeom prst="rect">
+            <a:avLst/>
+          </a:prstGeom>
+          <a:noFill/>
+          <a:ln>
+            <a:noFill/>
+          </a:ln>
+        </p:spPr>
+        <p:txBody>
+          <a:bodyPr spcFirstLastPara="1" wrap="square" lIns="91425" tIns="91425" rIns="91425" bIns="91425" anchor="t" anchorCtr="0">
+            <a:noAutofit/>
+          </a:bodyPr>
+          <a:lstStyle>
+            <a:defPPr marR="0" lvl="0" algn="l" rtl="0">
+              <a:lnSpc>
+                <a:spcPct val="100000"/>
+              </a:lnSpc>
+              <a:spcBef>
+                <a:spcPts val="0"/>
+              </a:spcBef>
+              <a:spcAft>
+                <a:spcPts val="0"/>
+              </a:spcAft>
+            </a:defPPr>
+            <a:lvl1pPr marR="0" lvl="0" algn="l" rtl="0">
+              <a:lnSpc>
+                <a:spcPct val="100000"/>
+              </a:lnSpc>
+              <a:spcBef>
+                <a:spcPts val="0"/>
+              </a:spcBef>
+              <a:spcAft>
+                <a:spcPts val="0"/>
+              </a:spcAft>
+              <a:buClr>
+                <a:schemeClr val="dk1"/>
+              </a:buClr>
+              <a:buSzPts val="2800"/>
+              <a:buFont typeface="Arial"/>
+              <a:buNone/>
+              <a:defRPr sz="2800" b="0" i="0" u="none" strike="noStrike" cap="none">
+                <a:solidFill>
+                  <a:schemeClr val="dk1"/>
+                </a:solidFill>
+                <a:latin typeface="Arial"/>
+                <a:ea typeface="Arial"/>
+                <a:cs typeface="Arial"/>
+                <a:sym typeface="Arial"/>
+              </a:defRPr>
+            </a:lvl1pPr>
+            <a:lvl2pPr marR="0" lvl="1" algn="l" rtl="0">
+              <a:lnSpc>
+                <a:spcPct val="100000"/>
+              </a:lnSpc>
+              <a:spcBef>
+                <a:spcPts val="0"/>
+              </a:spcBef>
+              <a:spcAft>
+                <a:spcPts val="0"/>
+              </a:spcAft>
+              <a:buClr>
+                <a:schemeClr val="dk1"/>
+              </a:buClr>
+              <a:buSzPts val="2800"/>
+              <a:buFont typeface="Arial"/>
+              <a:buNone/>
+              <a:defRPr sz="2800" b="0" i="0" u="none" strike="noStrike" cap="none">
+                <a:solidFill>
+                  <a:schemeClr val="dk1"/>
+                </a:solidFill>
+                <a:latin typeface="Arial"/>
+                <a:ea typeface="Arial"/>
+                <a:cs typeface="Arial"/>
+                <a:sym typeface="Arial"/>
+              </a:defRPr>
+            </a:lvl2pPr>
+            <a:lvl3pPr marR="0" lvl="2" algn="l" rtl="0">
+              <a:lnSpc>
+                <a:spcPct val="100000"/>
+              </a:lnSpc>
+              <a:spcBef>
+                <a:spcPts val="0"/>
+              </a:spcBef>
+              <a:spcAft>
+                <a:spcPts val="0"/>
+              </a:spcAft>
+              <a:buClr>
+                <a:schemeClr val="dk1"/>
+              </a:buClr>
+              <a:buSzPts val="2800"/>
+              <a:buFont typeface="Arial"/>
+              <a:buNone/>
+              <a:defRPr sz="2800" b="0" i="0" u="none" strike="noStrike" cap="none">
+                <a:solidFill>
+                  <a:schemeClr val="dk1"/>
+                </a:solidFill>
+                <a:latin typeface="Arial"/>
+                <a:ea typeface="Arial"/>
+                <a:cs typeface="Arial"/>
+                <a:sym typeface="Arial"/>
+              </a:defRPr>
+            </a:lvl3pPr>
+            <a:lvl4pPr marR="0" lvl="3" algn="l" rtl="0">
+              <a:lnSpc>
+                <a:spcPct val="100000"/>
+              </a:lnSpc>
+              <a:spcBef>
+                <a:spcPts val="0"/>
+              </a:spcBef>
+              <a:spcAft>
+                <a:spcPts val="0"/>
+              </a:spcAft>
+              <a:buClr>
+                <a:schemeClr val="dk1"/>
+              </a:buClr>
+              <a:buSzPts val="2800"/>
+              <a:buFont typeface="Arial"/>
+              <a:buNone/>
+              <a:defRPr sz="2800" b="0" i="0" u="none" strike="noStrike" cap="none">
+                <a:solidFill>
+                  <a:schemeClr val="dk1"/>
+                </a:solidFill>
+                <a:latin typeface="Arial"/>
+                <a:ea typeface="Arial"/>
+                <a:cs typeface="Arial"/>
+                <a:sym typeface="Arial"/>
+              </a:defRPr>
+            </a:lvl4pPr>
+            <a:lvl5pPr marR="0" lvl="4" algn="l" rtl="0">
+              <a:lnSpc>
+                <a:spcPct val="100000"/>
+              </a:lnSpc>
+              <a:spcBef>
+                <a:spcPts val="0"/>
+              </a:spcBef>
+              <a:spcAft>
+                <a:spcPts val="0"/>
+              </a:spcAft>
+              <a:buClr>
+                <a:schemeClr val="dk1"/>
+              </a:buClr>
+              <a:buSzPts val="2800"/>
+              <a:buFont typeface="Arial"/>
+              <a:buNone/>
+              <a:defRPr sz="2800" b="0" i="0" u="none" strike="noStrike" cap="none">
+                <a:solidFill>
+                  <a:schemeClr val="dk1"/>
+                </a:solidFill>
+                <a:latin typeface="Arial"/>
+                <a:ea typeface="Arial"/>
+                <a:cs typeface="Arial"/>
+                <a:sym typeface="Arial"/>
+              </a:defRPr>
+            </a:lvl5pPr>
+            <a:lvl6pPr marR="0" lvl="5" algn="l" rtl="0">
+              <a:lnSpc>
+                <a:spcPct val="100000"/>
+              </a:lnSpc>
+              <a:spcBef>
+                <a:spcPts val="0"/>
+              </a:spcBef>
+              <a:spcAft>
+                <a:spcPts val="0"/>
+              </a:spcAft>
+              <a:buClr>
+                <a:schemeClr val="dk1"/>
+              </a:buClr>
+              <a:buSzPts val="2800"/>
+              <a:buFont typeface="Arial"/>
+              <a:buNone/>
+              <a:defRPr sz="2800" b="0" i="0" u="none" strike="noStrike" cap="none">
+                <a:solidFill>
+                  <a:schemeClr val="dk1"/>
+                </a:solidFill>
+                <a:latin typeface="Arial"/>
+                <a:ea typeface="Arial"/>
+                <a:cs typeface="Arial"/>
+                <a:sym typeface="Arial"/>
+              </a:defRPr>
+            </a:lvl6pPr>
+            <a:lvl7pPr marR="0" lvl="6" algn="l" rtl="0">
+              <a:lnSpc>
+                <a:spcPct val="100000"/>
+              </a:lnSpc>
+              <a:spcBef>
+                <a:spcPts val="0"/>
+              </a:spcBef>
+              <a:spcAft>
+                <a:spcPts val="0"/>
+              </a:spcAft>
+              <a:buClr>
+                <a:schemeClr val="dk1"/>
+              </a:buClr>
+              <a:buSzPts val="2800"/>
+              <a:buFont typeface="Arial"/>
+              <a:buNone/>
+              <a:defRPr sz="2800" b="0" i="0" u="none" strike="noStrike" cap="none">
+                <a:solidFill>
+                  <a:schemeClr val="dk1"/>
+                </a:solidFill>
+                <a:latin typeface="Arial"/>
+                <a:ea typeface="Arial"/>
+                <a:cs typeface="Arial"/>
+                <a:sym typeface="Arial"/>
+              </a:defRPr>
+            </a:lvl7pPr>
+            <a:lvl8pPr marR="0" lvl="7" algn="l" rtl="0">
+              <a:lnSpc>
+                <a:spcPct val="100000"/>
+              </a:lnSpc>
+              <a:spcBef>
+                <a:spcPts val="0"/>
+              </a:spcBef>
+              <a:spcAft>
+                <a:spcPts val="0"/>
+              </a:spcAft>
+              <a:buClr>
+                <a:schemeClr val="dk1"/>
+              </a:buClr>
+              <a:buSzPts val="2800"/>
+              <a:buFont typeface="Arial"/>
+              <a:buNone/>
+              <a:defRPr sz="2800" b="0" i="0" u="none" strike="noStrike" cap="none">
+                <a:solidFill>
+                  <a:schemeClr val="dk1"/>
+                </a:solidFill>
+                <a:latin typeface="Arial"/>
+                <a:ea typeface="Arial"/>
+                <a:cs typeface="Arial"/>
+                <a:sym typeface="Arial"/>
+              </a:defRPr>
+            </a:lvl8pPr>
+            <a:lvl9pPr marR="0" lvl="8" algn="l" rtl="0">
+              <a:lnSpc>
+                <a:spcPct val="100000"/>
+              </a:lnSpc>
+              <a:spcBef>
+                <a:spcPts val="0"/>
+              </a:spcBef>
+              <a:spcAft>
+                <a:spcPts val="0"/>
+              </a:spcAft>
+              <a:buClr>
+                <a:schemeClr val="dk1"/>
+              </a:buClr>
+              <a:buSzPts val="2800"/>
+              <a:buFont typeface="Arial"/>
+              <a:buNone/>
+              <a:defRPr sz="2800" b="0" i="0" u="none" strike="noStrike" cap="none">
+                <a:solidFill>
+                  <a:schemeClr val="dk1"/>
+                </a:solidFill>
+                <a:latin typeface="Arial"/>
+                <a:ea typeface="Arial"/>
+                <a:cs typeface="Arial"/>
+                <a:sym typeface="Arial"/>
+              </a:defRPr>
+            </a:lvl9pPr>
+          </a:lstStyle>
+          <a:p>
+            <a:r>
+              <a:rPr lang="en-US" sz="2100" b="1" dirty="0">
+                <a:solidFill>
+                  <a:schemeClr val="tx1"/>
+                </a:solidFill>
+                <a:latin typeface="Montserrat"/>
+              </a:rPr>
+              <a:t>Project repository</a:t>
+            </a:r>
+            <a:endParaRPr lang="ru-RU" sz="2100" dirty="0"/>
+          </a:p>
+        </p:txBody>
+      </p:sp>
+      <p:pic>
+        <p:nvPicPr>
+          <p:cNvPr id="11" name="Google Shape;230;p56">
+            <a:extLst>
+              <a:ext uri="{FF2B5EF4-FFF2-40B4-BE49-F238E27FC236}">
+                <a16:creationId xmlns:a16="http://schemas.microsoft.com/office/drawing/2014/main" id="{CB3428E0-A405-4430-9317-8BD2A16E1B47}"/>
               </a:ext>
             </a:extLst>
           </p:cNvPr>
@@ -7350,189 +9211,10 @@
           </a:ln>
         </p:spPr>
       </p:pic>
-      <p:pic>
-        <p:nvPicPr>
-          <p:cNvPr id="22" name="Рисунок 21" descr="Изображение выглядит как текст, снимок экрана, Прямоугольник, Красочность&#10;&#10;Автоматически созданное описание">
-            <a:extLst>
-              <a:ext uri="{FF2B5EF4-FFF2-40B4-BE49-F238E27FC236}">
-                <a16:creationId xmlns:a16="http://schemas.microsoft.com/office/drawing/2014/main" id="{FB127A84-F9AF-4295-A4C3-BBDA166A5A99}"/>
-              </a:ext>
-            </a:extLst>
-          </p:cNvPr>
-          <p:cNvPicPr>
-            <a:picLocks noChangeAspect="1"/>
-          </p:cNvPicPr>
-          <p:nvPr/>
-        </p:nvPicPr>
-        <p:blipFill rotWithShape="1">
-          <a:blip r:embed="rId5"/>
-          <a:srcRect b="9946"/>
-          <a:stretch/>
-        </p:blipFill>
-        <p:spPr>
-          <a:xfrm>
-            <a:off x="0" y="1226820"/>
-            <a:ext cx="4349252" cy="3916680"/>
-          </a:xfrm>
-          <a:prstGeom prst="rect">
-            <a:avLst/>
-          </a:prstGeom>
-        </p:spPr>
-      </p:pic>
-      <p:sp>
-        <p:nvSpPr>
-          <p:cNvPr id="23" name="TextBox 22">
-            <a:extLst>
-              <a:ext uri="{FF2B5EF4-FFF2-40B4-BE49-F238E27FC236}">
-                <a16:creationId xmlns:a16="http://schemas.microsoft.com/office/drawing/2014/main" id="{94D1AB24-4D4F-4385-A1E8-C30A5D2366CF}"/>
-              </a:ext>
-            </a:extLst>
-          </p:cNvPr>
-          <p:cNvSpPr txBox="1"/>
-          <p:nvPr/>
-        </p:nvSpPr>
-        <p:spPr>
-          <a:xfrm>
-            <a:off x="-1" y="837495"/>
-            <a:ext cx="4343401" cy="461665"/>
-          </a:xfrm>
-          <a:prstGeom prst="rect">
-            <a:avLst/>
-          </a:prstGeom>
-          <a:noFill/>
-        </p:spPr>
-        <p:txBody>
-          <a:bodyPr wrap="square" rtlCol="0">
-            <a:spAutoFit/>
-          </a:bodyPr>
-          <a:lstStyle/>
-          <a:p>
-            <a:pPr algn="ctr"/>
-            <a:r>
-              <a:rPr lang="en-US" sz="1200" dirty="0">
-                <a:solidFill>
-                  <a:schemeClr val="dk1"/>
-                </a:solidFill>
-                <a:latin typeface="Montserrat"/>
-              </a:rPr>
-              <a:t>Cluster map of top-100 transcript with upregulation in expression</a:t>
-            </a:r>
-            <a:endParaRPr lang="ru-RU" sz="1200" dirty="0">
-              <a:solidFill>
-                <a:schemeClr val="dk1"/>
-              </a:solidFill>
-              <a:latin typeface="Montserrat"/>
-            </a:endParaRPr>
-          </a:p>
-        </p:txBody>
-      </p:sp>
-      <p:sp>
-        <p:nvSpPr>
-          <p:cNvPr id="34" name="TextBox 33">
-            <a:extLst>
-              <a:ext uri="{FF2B5EF4-FFF2-40B4-BE49-F238E27FC236}">
-                <a16:creationId xmlns:a16="http://schemas.microsoft.com/office/drawing/2014/main" id="{3526FF27-A379-490C-940C-0DC1CAE7EF77}"/>
-              </a:ext>
-            </a:extLst>
-          </p:cNvPr>
-          <p:cNvSpPr txBox="1"/>
-          <p:nvPr/>
-        </p:nvSpPr>
-        <p:spPr>
-          <a:xfrm>
-            <a:off x="4671906" y="837495"/>
-            <a:ext cx="4349252" cy="461665"/>
-          </a:xfrm>
-          <a:prstGeom prst="rect">
-            <a:avLst/>
-          </a:prstGeom>
-          <a:noFill/>
-        </p:spPr>
-        <p:txBody>
-          <a:bodyPr wrap="square" rtlCol="0">
-            <a:spAutoFit/>
-          </a:bodyPr>
-          <a:lstStyle/>
-          <a:p>
-            <a:pPr algn="ctr"/>
-            <a:r>
-              <a:rPr lang="en-US" sz="1200" dirty="0">
-                <a:solidFill>
-                  <a:schemeClr val="dk1"/>
-                </a:solidFill>
-                <a:latin typeface="Montserrat"/>
-              </a:rPr>
-              <a:t>Cluster map of top-100 transcript with downregulation in expression</a:t>
-            </a:r>
-            <a:endParaRPr lang="ru-RU" sz="1200" dirty="0">
-              <a:solidFill>
-                <a:schemeClr val="dk1"/>
-              </a:solidFill>
-              <a:latin typeface="Montserrat"/>
-            </a:endParaRPr>
-          </a:p>
-        </p:txBody>
-      </p:sp>
-      <p:sp>
-        <p:nvSpPr>
-          <p:cNvPr id="37" name="Google Shape;229;p56">
-            <a:extLst>
-              <a:ext uri="{FF2B5EF4-FFF2-40B4-BE49-F238E27FC236}">
-                <a16:creationId xmlns:a16="http://schemas.microsoft.com/office/drawing/2014/main" id="{C678E574-EA98-471C-A741-84BF45069FB7}"/>
-              </a:ext>
-            </a:extLst>
-          </p:cNvPr>
-          <p:cNvSpPr txBox="1">
-            <a:spLocks noGrp="1"/>
-          </p:cNvSpPr>
-          <p:nvPr>
-            <p:ph type="title"/>
-          </p:nvPr>
-        </p:nvSpPr>
-        <p:spPr>
-          <a:xfrm>
-            <a:off x="124811" y="161400"/>
-            <a:ext cx="6618889" cy="676800"/>
-          </a:xfrm>
-          <a:prstGeom prst="rect">
-            <a:avLst/>
-          </a:prstGeom>
-          <a:noFill/>
-        </p:spPr>
-        <p:txBody>
-          <a:bodyPr spcFirstLastPara="1" wrap="square" lIns="91425" tIns="91425" rIns="91425" bIns="91425" anchor="t" anchorCtr="0">
-            <a:noAutofit/>
-          </a:bodyPr>
-          <a:lstStyle/>
-          <a:p>
-            <a:pPr>
-              <a:buSzPts val="3400"/>
-            </a:pPr>
-            <a:r>
-              <a:rPr lang="en-US" sz="1600" b="1" dirty="0">
-                <a:solidFill>
-                  <a:schemeClr val="tx1"/>
-                </a:solidFill>
-                <a:latin typeface="Montserrat"/>
-                <a:ea typeface="Montserrat"/>
-                <a:cs typeface="Montserrat"/>
-                <a:sym typeface="Montserrat"/>
-              </a:rPr>
-              <a:t>Identify 100 transcripts with most remarkable upregulation and downregulation in expression.</a:t>
-            </a:r>
-            <a:endParaRPr lang="en-US" sz="1600" b="1" dirty="0">
-              <a:latin typeface="Montserrat"/>
-              <a:ea typeface="Montserrat"/>
-              <a:cs typeface="Montserrat"/>
-              <a:sym typeface="Montserrat"/>
-            </a:endParaRPr>
-          </a:p>
-        </p:txBody>
-      </p:sp>
     </p:spTree>
     <p:extLst>
       <p:ext uri="{BB962C8B-B14F-4D97-AF65-F5344CB8AC3E}">
-        <p14:creationId xmlns:p14="http://schemas.microsoft.com/office/powerpoint/2010/main" val="1475169408"/>
+        <p14:creationId xmlns:p14="http://schemas.microsoft.com/office/powerpoint/2010/main" val="3417342444"/>
       </p:ext>
     </p:extLst>
   </p:cSld>

</xml_diff>

<commit_message>
Add README.md, update lab journal
</commit_message>
<xml_diff>
--- a/data_folder/processed_data/presentation/Отчётная презентация 25 мая 2024 BIOINF Education.pptx
+++ b/data_folder/processed_data/presentation/Отчётная презентация 25 мая 2024 BIOINF Education.pptx
@@ -7343,7 +7343,7 @@
         <p:spPr>
           <a:xfrm>
             <a:off x="124811" y="1550293"/>
-            <a:ext cx="4048876" cy="2862322"/>
+            <a:ext cx="4048876" cy="2031325"/>
           </a:xfrm>
           <a:prstGeom prst="rect">
             <a:avLst/>
@@ -7361,15 +7361,13 @@
               <a:buChar char="•"/>
             </a:pPr>
             <a:r>
-              <a:rPr lang="en-US" sz="1800" dirty="0">
-                <a:solidFill>
-                  <a:srgbClr val="000000"/>
-                </a:solidFill>
-                <a:effectLst/>
-                <a:latin typeface="Times New Roman" panose="02020603050405020304" pitchFamily="18" charset="0"/>
-                <a:ea typeface="Times New Roman" panose="02020603050405020304" pitchFamily="18" charset="0"/>
+              <a:rPr lang="en-US" dirty="0">
+                <a:solidFill>
+                  <a:schemeClr val="dk1"/>
+                </a:solidFill>
+                <a:latin typeface="Montserrat"/>
               </a:rPr>
-              <a:t>We identified 123445 differentially expressed transcripts, 5196 (4.2%) of them show significant change in expression (i.e. adjusted p-value was lesser than 0.05).</a:t>
+              <a:t>We identified 123445 differentially expressed transcripts, 5196 (4.2%) of them show significant change in expression.</a:t>
             </a:r>
           </a:p>
           <a:p>
@@ -7378,17 +7376,20 @@
               <a:buChar char="•"/>
             </a:pPr>
             <a:r>
-              <a:rPr lang="en-US" sz="1800" dirty="0">
-                <a:solidFill>
-                  <a:srgbClr val="000000"/>
-                </a:solidFill>
-                <a:effectLst/>
-                <a:latin typeface="Times New Roman" panose="02020603050405020304" pitchFamily="18" charset="0"/>
-                <a:ea typeface="Times New Roman" panose="02020603050405020304" pitchFamily="18" charset="0"/>
+              <a:rPr lang="en-US" dirty="0">
+                <a:solidFill>
+                  <a:schemeClr val="dk1"/>
+                </a:solidFill>
+                <a:latin typeface="Montserrat"/>
               </a:rPr>
               <a:t>An upregulation in expression was observed for most transcripts (orange and red dots) while little part showed downregulation in expression (blue and green dots).</a:t>
             </a:r>
-            <a:endParaRPr lang="ru-RU" dirty="0"/>
+            <a:endParaRPr lang="ru-RU" dirty="0">
+              <a:solidFill>
+                <a:schemeClr val="dk1"/>
+              </a:solidFill>
+              <a:latin typeface="Montserrat"/>
+            </a:endParaRPr>
           </a:p>
         </p:txBody>
       </p:sp>
@@ -8165,7 +8166,7 @@
         <p:spPr>
           <a:xfrm>
             <a:off x="124811" y="1550293"/>
-            <a:ext cx="4048876" cy="2308324"/>
+            <a:ext cx="4048876" cy="1384995"/>
           </a:xfrm>
           <a:prstGeom prst="rect">
             <a:avLst/>
@@ -8183,15 +8184,13 @@
               <a:buChar char="•"/>
             </a:pPr>
             <a:r>
-              <a:rPr lang="en-US" sz="1800" dirty="0">
-                <a:solidFill>
-                  <a:srgbClr val="000000"/>
-                </a:solidFill>
-                <a:effectLst/>
-                <a:latin typeface="Times New Roman" panose="02020603050405020304" pitchFamily="18" charset="0"/>
-                <a:ea typeface="Times New Roman" panose="02020603050405020304" pitchFamily="18" charset="0"/>
+              <a:rPr lang="en-US" dirty="0">
+                <a:solidFill>
+                  <a:schemeClr val="dk1"/>
+                </a:solidFill>
+                <a:latin typeface="Montserrat"/>
               </a:rPr>
-              <a:t>Top-100 transcripts with downregulation in expression predominantly corresponded to genes of different types of collagens (5 transcripts in total)</a:t>
+              <a:t>Top-100 transcripts with downregulation in expression predominantly corresponded to genes of different types of collagens;</a:t>
             </a:r>
           </a:p>
           <a:p>
@@ -8200,17 +8199,20 @@
               <a:buChar char="•"/>
             </a:pPr>
             <a:r>
-              <a:rPr lang="en-US" sz="1800" dirty="0">
-                <a:solidFill>
-                  <a:srgbClr val="000000"/>
-                </a:solidFill>
-                <a:effectLst/>
-                <a:latin typeface="Times New Roman" panose="02020603050405020304" pitchFamily="18" charset="0"/>
-                <a:ea typeface="Times New Roman" panose="02020603050405020304" pitchFamily="18" charset="0"/>
+              <a:rPr lang="en-US" dirty="0">
+                <a:solidFill>
+                  <a:schemeClr val="dk1"/>
+                </a:solidFill>
+                <a:latin typeface="Montserrat"/>
               </a:rPr>
-              <a:t>They also include members of Notch signaling pathway (4 transcripts in total)</a:t>
+              <a:t>They also include members of Notch signaling pathway.</a:t>
             </a:r>
-            <a:endParaRPr lang="ru-RU" dirty="0"/>
+            <a:endParaRPr lang="ru-RU" dirty="0">
+              <a:solidFill>
+                <a:schemeClr val="dk1"/>
+              </a:solidFill>
+              <a:latin typeface="Montserrat"/>
+            </a:endParaRPr>
           </a:p>
         </p:txBody>
       </p:sp>
@@ -8692,7 +8694,7 @@
         <p:spPr>
           <a:xfrm>
             <a:off x="124811" y="1550293"/>
-            <a:ext cx="4048876" cy="1200329"/>
+            <a:ext cx="4048876" cy="738664"/>
           </a:xfrm>
           <a:prstGeom prst="rect">
             <a:avLst/>
@@ -8710,39 +8712,38 @@
               <a:buChar char="•"/>
             </a:pPr>
             <a:r>
-              <a:rPr lang="en-US" sz="1800" dirty="0">
-                <a:solidFill>
-                  <a:srgbClr val="000000"/>
-                </a:solidFill>
-                <a:effectLst/>
-                <a:latin typeface="Times New Roman" panose="02020603050405020304" pitchFamily="18" charset="0"/>
-                <a:ea typeface="Times New Roman" panose="02020603050405020304" pitchFamily="18" charset="0"/>
+              <a:rPr lang="en-US" dirty="0">
+                <a:solidFill>
+                  <a:schemeClr val="dk1"/>
+                </a:solidFill>
+                <a:latin typeface="Montserrat"/>
               </a:rPr>
               <a:t>Among the top-100 transcripts with upregulation in expression, we identified members of </a:t>
             </a:r>
             <a:r>
-              <a:rPr lang="en-US" sz="1800" dirty="0" err="1">
-                <a:solidFill>
-                  <a:srgbClr val="000000"/>
-                </a:solidFill>
-                <a:effectLst/>
-                <a:latin typeface="Times New Roman" panose="02020603050405020304" pitchFamily="18" charset="0"/>
-                <a:ea typeface="Times New Roman" panose="02020603050405020304" pitchFamily="18" charset="0"/>
+              <a:rPr lang="en-US" dirty="0" err="1">
+                <a:solidFill>
+                  <a:schemeClr val="dk1"/>
+                </a:solidFill>
+                <a:latin typeface="Montserrat"/>
               </a:rPr>
               <a:t>cWnt</a:t>
             </a:r>
             <a:r>
-              <a:rPr lang="en-US" sz="1800" dirty="0">
-                <a:solidFill>
-                  <a:srgbClr val="000000"/>
-                </a:solidFill>
-                <a:effectLst/>
-                <a:latin typeface="Times New Roman" panose="02020603050405020304" pitchFamily="18" charset="0"/>
-                <a:ea typeface="Times New Roman" panose="02020603050405020304" pitchFamily="18" charset="0"/>
+              <a:rPr lang="en-US" dirty="0">
+                <a:solidFill>
+                  <a:schemeClr val="dk1"/>
+                </a:solidFill>
+                <a:latin typeface="Montserrat"/>
               </a:rPr>
-              <a:t> pathway (8 transcripts in total).</a:t>
+              <a:t> pathway.</a:t>
             </a:r>
-            <a:endParaRPr lang="ru-RU" dirty="0"/>
+            <a:endParaRPr lang="ru-RU" dirty="0">
+              <a:solidFill>
+                <a:schemeClr val="dk1"/>
+              </a:solidFill>
+              <a:latin typeface="Montserrat"/>
+            </a:endParaRPr>
           </a:p>
         </p:txBody>
       </p:sp>
@@ -8762,6 +8763,14 @@
 <file path=ppt/slides/slide6.xml><?xml version="1.0" encoding="utf-8"?>
 <p:sld xmlns:a="http://schemas.openxmlformats.org/drawingml/2006/main" xmlns:r="http://schemas.openxmlformats.org/officeDocument/2006/relationships" xmlns:p="http://schemas.openxmlformats.org/presentationml/2006/main">
   <p:cSld>
+    <p:bg>
+      <p:bgPr>
+        <a:solidFill>
+          <a:schemeClr val="lt1"/>
+        </a:solidFill>
+        <a:effectLst/>
+      </p:bgPr>
+    </p:bg>
     <p:spTree>
       <p:nvGrpSpPr>
         <p:cNvPr id="1" name=""/>
@@ -8789,7 +8798,7 @@
           <p:nvPr/>
         </p:nvPicPr>
         <p:blipFill rotWithShape="1">
-          <a:blip r:embed="rId2">
+          <a:blip r:embed="rId3">
             <a:alphaModFix amt="27000"/>
           </a:blip>
           <a:srcRect r="75555" b="60130"/>
@@ -8831,10 +8840,11 @@
           <a:lstStyle/>
           <a:p>
             <a:r>
-              <a:rPr lang="en-US" dirty="0">
-                <a:solidFill>
-                  <a:schemeClr val="tx1"/>
-                </a:solidFill>
+              <a:rPr lang="en-US" sz="1400" dirty="0">
+                <a:solidFill>
+                  <a:schemeClr val="dk1"/>
+                </a:solidFill>
+                <a:latin typeface="Montserrat"/>
               </a:rPr>
               <a:t>Code, workflow details and processed data available in project repository:</a:t>
             </a:r>
@@ -8844,14 +8854,31 @@
               <a:buNone/>
             </a:pPr>
             <a:r>
-              <a:rPr lang="ru-RU" dirty="0">
-                <a:solidFill>
-                  <a:srgbClr val="0097A7"/>
-                </a:solidFill>
+              <a:rPr lang="ru-RU" sz="1400" dirty="0">
+                <a:solidFill>
+                  <a:schemeClr val="dk1"/>
+                </a:solidFill>
+                <a:latin typeface="Montserrat"/>
+                <a:hlinkClick r:id="rId4"/>
               </a:rPr>
-              <a:t>https://github.com/angrygeese/DynamenaProject_BI2023-24/tree/main</a:t>
+              <a:t>https://github.com/angrygeese/DynamenaProject_BI2023-24/tree</a:t>
             </a:r>
-            <a:endParaRPr lang="ru-RU" dirty="0"/>
+            <a:r>
+              <a:rPr lang="ru-RU" sz="1400">
+                <a:solidFill>
+                  <a:schemeClr val="dk1"/>
+                </a:solidFill>
+                <a:latin typeface="Montserrat"/>
+                <a:hlinkClick r:id="rId4"/>
+              </a:rPr>
+              <a:t>/main</a:t>
+            </a:r>
+            <a:endParaRPr lang="ru-RU" sz="1400" dirty="0">
+              <a:solidFill>
+                <a:schemeClr val="dk1"/>
+              </a:solidFill>
+              <a:latin typeface="Montserrat"/>
+            </a:endParaRPr>
           </a:p>
         </p:txBody>
       </p:sp>
@@ -8870,7 +8897,7 @@
           <p:nvPr/>
         </p:nvPicPr>
         <p:blipFill>
-          <a:blip r:embed="rId3"/>
+          <a:blip r:embed="rId5"/>
           <a:stretch>
             <a:fillRect/>
           </a:stretch>
@@ -9190,7 +9217,7 @@
           <p:nvPr/>
         </p:nvPicPr>
         <p:blipFill>
-          <a:blip r:embed="rId4">
+          <a:blip r:embed="rId6">
             <a:alphaModFix/>
           </a:blip>
           <a:stretch>
@@ -9219,7 +9246,7 @@
     </p:extLst>
   </p:cSld>
   <p:clrMapOvr>
-    <a:masterClrMapping/>
+    <a:overrideClrMapping bg1="lt1" tx1="dk1" bg2="dk2" tx2="lt2" accent1="accent1" accent2="accent2" accent3="accent3" accent4="accent4" accent5="accent5" accent6="accent6" hlink="hlink" folHlink="folHlink"/>
   </p:clrMapOvr>
 </p:sld>
 </file>
@@ -9784,4 +9811,47 @@
   <a:objectDefaults/>
   <a:extraClrSchemeLst/>
 </a:theme>
+</file>
+
+<file path=ppt/theme/themeOverride1.xml><?xml version="1.0" encoding="utf-8"?>
+<a:themeOverride xmlns:a="http://schemas.openxmlformats.org/drawingml/2006/main">
+  <a:clrScheme name="Simple Light">
+    <a:dk1>
+      <a:srgbClr val="000000"/>
+    </a:dk1>
+    <a:lt1>
+      <a:srgbClr val="FFFFFF"/>
+    </a:lt1>
+    <a:dk2>
+      <a:srgbClr val="595959"/>
+    </a:dk2>
+    <a:lt2>
+      <a:srgbClr val="EEEEEE"/>
+    </a:lt2>
+    <a:accent1>
+      <a:srgbClr val="4285F4"/>
+    </a:accent1>
+    <a:accent2>
+      <a:srgbClr val="212121"/>
+    </a:accent2>
+    <a:accent3>
+      <a:srgbClr val="78909C"/>
+    </a:accent3>
+    <a:accent4>
+      <a:srgbClr val="FFAB40"/>
+    </a:accent4>
+    <a:accent5>
+      <a:srgbClr val="0097A7"/>
+    </a:accent5>
+    <a:accent6>
+      <a:srgbClr val="EEFF41"/>
+    </a:accent6>
+    <a:hlink>
+      <a:srgbClr val="0097A7"/>
+    </a:hlink>
+    <a:folHlink>
+      <a:srgbClr val="0097A7"/>
+    </a:folHlink>
+  </a:clrScheme>
+</a:themeOverride>
 </file>
</xml_diff>